<commit_message>
Added Conclusions on the ppt and created a PDF version of the same
</commit_message>
<xml_diff>
--- a/Lead Scoring Assignment.pptx
+++ b/Lead Scoring Assignment.pptx
@@ -135,6 +135,11 @@
       </a:defRPr>
     </a:lvl9pPr>
   </p:defaultTextStyle>
+  <p:extLst>
+    <p:ext uri="{EFAFB233-063F-42B5-8137-9DF3F51BA10A}">
+      <p15:sldGuideLst xmlns:p15="http://schemas.microsoft.com/office/powerpoint/2012/main"/>
+    </p:ext>
+  </p:extLst>
 </p:presentation>
 </file>
 
@@ -8931,7 +8936,7 @@
           <a:p>
             <a:fld id="{6AD6EE87-EBD5-4F12-A48A-63ACA297AC8F}" type="datetimeFigureOut">
               <a:rPr lang="en-US" dirty="0"/>
-              <a:t>3/24/24</a:t>
+              <a:t>3/25/24</a:t>
             </a:fld>
             <a:endParaRPr lang="en-US" dirty="0"/>
           </a:p>
@@ -9133,7 +9138,7 @@
           <a:p>
             <a:fld id="{4CD73815-2707-4475-8F1A-B873CB631BB4}" type="datetimeFigureOut">
               <a:rPr lang="en-US" dirty="0"/>
-              <a:t>3/24/24</a:t>
+              <a:t>3/25/24</a:t>
             </a:fld>
             <a:endParaRPr lang="en-US" dirty="0"/>
           </a:p>
@@ -9308,7 +9313,7 @@
           <a:p>
             <a:fld id="{2A4AFB99-0EAB-4182-AFF8-E214C82A68F6}" type="datetimeFigureOut">
               <a:rPr lang="en-US" dirty="0"/>
-              <a:t>3/24/24</a:t>
+              <a:t>3/25/24</a:t>
             </a:fld>
             <a:endParaRPr lang="en-US" dirty="0"/>
           </a:p>
@@ -9508,7 +9513,7 @@
           <a:p>
             <a:fld id="{A5D3794B-289A-4A80-97D7-111025398D45}" type="datetimeFigureOut">
               <a:rPr lang="en-US" dirty="0"/>
-              <a:t>3/24/24</a:t>
+              <a:t>3/25/24</a:t>
             </a:fld>
             <a:endParaRPr lang="en-US" dirty="0"/>
           </a:p>
@@ -18401,7 +18406,7 @@
           <a:p>
             <a:fld id="{5A61015F-7CC6-4D0A-9D87-873EA4C304CC}" type="datetimeFigureOut">
               <a:rPr lang="en-US" dirty="0"/>
-              <a:t>3/24/24</a:t>
+              <a:t>3/25/24</a:t>
             </a:fld>
             <a:endParaRPr lang="en-US" dirty="0"/>
           </a:p>
@@ -18670,7 +18675,7 @@
           <a:p>
             <a:fld id="{93C6A301-0538-44EC-B09D-202E1042A48B}" type="datetimeFigureOut">
               <a:rPr lang="en-US" dirty="0"/>
-              <a:t>3/24/24</a:t>
+              <a:t>3/25/24</a:t>
             </a:fld>
             <a:endParaRPr lang="en-US" dirty="0"/>
           </a:p>
@@ -19063,7 +19068,7 @@
           <a:p>
             <a:fld id="{D789574A-8875-45EF-8EA2-3CAA0F7ABC4C}" type="datetimeFigureOut">
               <a:rPr lang="en-US" dirty="0"/>
-              <a:t>3/24/24</a:t>
+              <a:t>3/25/24</a:t>
             </a:fld>
             <a:endParaRPr lang="en-US" dirty="0"/>
           </a:p>
@@ -19176,7 +19181,7 @@
           <a:p>
             <a:fld id="{67EF4D4C-5367-4C26-9E2B-D8088D7FCA81}" type="datetimeFigureOut">
               <a:rPr lang="en-US" dirty="0"/>
-              <a:t>3/24/24</a:t>
+              <a:t>3/25/24</a:t>
             </a:fld>
             <a:endParaRPr lang="en-US" dirty="0"/>
           </a:p>
@@ -19266,7 +19271,7 @@
           <a:p>
             <a:fld id="{56E91E96-98B0-4413-9547-46F3504108EF}" type="datetimeFigureOut">
               <a:rPr lang="en-US" dirty="0"/>
-              <a:t>3/24/24</a:t>
+              <a:t>3/25/24</a:t>
             </a:fld>
             <a:endParaRPr lang="en-US" dirty="0"/>
           </a:p>
@@ -19551,7 +19556,7 @@
           <a:p>
             <a:fld id="{05C68B11-C5A8-448C-8CE9-B1A273C79CFC}" type="datetimeFigureOut">
               <a:rPr lang="en-US" dirty="0"/>
-              <a:t>3/24/24</a:t>
+              <a:t>3/25/24</a:t>
             </a:fld>
             <a:endParaRPr lang="en-US" dirty="0"/>
           </a:p>
@@ -19826,7 +19831,7 @@
           <a:p>
             <a:fld id="{C7616CA0-919D-4A49-9C8A-62FDFB3A5183}" type="datetimeFigureOut">
               <a:rPr lang="en-US" dirty="0"/>
-              <a:t>3/24/24</a:t>
+              <a:t>3/25/24</a:t>
             </a:fld>
             <a:endParaRPr lang="en-US" dirty="0"/>
           </a:p>
@@ -20072,7 +20077,7 @@
             <a:fld id="{90298CD5-6C1E-4009-B41F-6DF62E31D3BE}" type="datetimeFigureOut">
               <a:rPr lang="en-US" dirty="0"/>
               <a:pPr/>
-              <a:t>3/24/24</a:t>
+              <a:t>3/25/24</a:t>
             </a:fld>
             <a:endParaRPr lang="en-US" dirty="0"/>
           </a:p>
@@ -25874,12 +25879,18 @@
                     <a:p>
                       <a:pPr algn="l" fontAlgn="b"/>
                       <a:r>
-                        <a:rPr lang="en-IN" sz="1200" u="none" strike="noStrike">
+                        <a:rPr lang="en-IN" sz="1200" u="none" strike="noStrike" dirty="0">
                           <a:effectLst/>
                         </a:rPr>
-                        <a:t>Last Notable Activity_Modified</a:t>
+                        <a:t>Last Notable </a:t>
                       </a:r>
-                      <a:endParaRPr lang="en-IN" sz="1200" b="0" i="0" u="none" strike="noStrike">
+                      <a:r>
+                        <a:rPr lang="en-IN" sz="1200" u="none" strike="noStrike" dirty="0" err="1">
+                          <a:effectLst/>
+                        </a:rPr>
+                        <a:t>Activity_Modified</a:t>
+                      </a:r>
+                      <a:endParaRPr lang="en-IN" sz="1200" b="0" i="0" u="none" strike="noStrike" dirty="0">
                         <a:solidFill>
                           <a:srgbClr val="000000"/>
                         </a:solidFill>
@@ -30720,7 +30731,7 @@
         <p:spPr>
           <a:xfrm>
             <a:off x="969264" y="1217258"/>
-            <a:ext cx="10253472" cy="4096422"/>
+            <a:ext cx="10253472" cy="3288195"/>
           </a:xfrm>
         </p:spPr>
         <p:txBody>
@@ -30737,8 +30748,55 @@
               <a:buChar char="Ø"/>
             </a:pPr>
             <a:r>
-              <a:rPr lang="en-IN" sz="2000" dirty="0"/>
-              <a:t>XYZ</a:t>
+              <a:rPr lang="en-IN" sz="1800" dirty="0"/>
+              <a:t>The current status of the leads, denoted by the Tags places a very crucial part in scoring the leads</a:t>
+            </a:r>
+          </a:p>
+          <a:p>
+            <a:pPr lvl="1">
+              <a:lnSpc>
+                <a:spcPct val="70000"/>
+              </a:lnSpc>
+              <a:buFont typeface="Wingdings" pitchFamily="2" charset="2"/>
+              <a:buChar char="Ø"/>
+            </a:pPr>
+            <a:r>
+              <a:rPr lang="en-IN" sz="1400" dirty="0"/>
+              <a:t>10 out of 13 important variables are based on Tags</a:t>
+            </a:r>
+          </a:p>
+          <a:p>
+            <a:pPr lvl="1">
+              <a:lnSpc>
+                <a:spcPct val="70000"/>
+              </a:lnSpc>
+              <a:buFont typeface="Wingdings" pitchFamily="2" charset="2"/>
+              <a:buChar char="Ø"/>
+            </a:pPr>
+            <a:r>
+              <a:rPr lang="en-IN" sz="1400" dirty="0"/>
+              <a:t>Tags like closed by </a:t>
+            </a:r>
+            <a:r>
+              <a:rPr lang="en-IN" sz="1400" dirty="0" err="1"/>
+              <a:t>Horizzon</a:t>
+            </a:r>
+            <a:r>
+              <a:rPr lang="en-IN" sz="1400" dirty="0"/>
+              <a:t>, Lost to EINS and Will revert after reading email has higher positive impact towards conversion</a:t>
+            </a:r>
+          </a:p>
+          <a:p>
+            <a:pPr lvl="1">
+              <a:lnSpc>
+                <a:spcPct val="70000"/>
+              </a:lnSpc>
+              <a:buFont typeface="Wingdings" pitchFamily="2" charset="2"/>
+              <a:buChar char="Ø"/>
+            </a:pPr>
+            <a:r>
+              <a:rPr lang="en-IN" sz="1400" dirty="0"/>
+              <a:t>Tags like Already a student, switched off and invalid number has a high negative impact towards conversion. These tags makes sense logically.</a:t>
             </a:r>
           </a:p>
           <a:p>
@@ -30750,8 +30808,64 @@
               <a:buChar char="Ø"/>
             </a:pPr>
             <a:r>
-              <a:rPr lang="en-IN" sz="2000" dirty="0"/>
-              <a:t>ABC</a:t>
+              <a:rPr lang="en-IN" sz="1800" dirty="0"/>
+              <a:t>Last Notable Activity with Modified values has a good positive impact towards conversions</a:t>
+            </a:r>
+          </a:p>
+          <a:p>
+            <a:pPr>
+              <a:lnSpc>
+                <a:spcPct val="70000"/>
+              </a:lnSpc>
+              <a:buFont typeface="Wingdings" pitchFamily="2" charset="2"/>
+              <a:buChar char="Ø"/>
+            </a:pPr>
+            <a:r>
+              <a:rPr lang="en-IN" sz="1800" dirty="0"/>
+              <a:t>Last Activity of SMS sent has a good positive impact on lead conversions too.</a:t>
+            </a:r>
+          </a:p>
+          <a:p>
+            <a:pPr>
+              <a:lnSpc>
+                <a:spcPct val="70000"/>
+              </a:lnSpc>
+              <a:buFont typeface="Wingdings" pitchFamily="2" charset="2"/>
+              <a:buChar char="Ø"/>
+            </a:pPr>
+            <a:r>
+              <a:rPr lang="en-IN" sz="1800" dirty="0" err="1"/>
+              <a:t>Welingak</a:t>
+            </a:r>
+            <a:r>
+              <a:rPr lang="en-IN" sz="1800" dirty="0"/>
+              <a:t> Website as a Lead Source has a reasonable positive impact towards conversions</a:t>
+            </a:r>
+          </a:p>
+          <a:p>
+            <a:pPr>
+              <a:lnSpc>
+                <a:spcPct val="70000"/>
+              </a:lnSpc>
+              <a:buFont typeface="Wingdings" pitchFamily="2" charset="2"/>
+              <a:buChar char="Ø"/>
+            </a:pPr>
+            <a:r>
+              <a:rPr lang="en-IN" sz="1800" dirty="0"/>
+              <a:t>Leads originating from Lead Add forms have a low but positive impact towards conversions</a:t>
+            </a:r>
+          </a:p>
+          <a:p>
+            <a:pPr>
+              <a:lnSpc>
+                <a:spcPct val="70000"/>
+              </a:lnSpc>
+              <a:buFont typeface="Wingdings" pitchFamily="2" charset="2"/>
+              <a:buChar char="Ø"/>
+            </a:pPr>
+            <a:r>
+              <a:rPr lang="en-IN" sz="1800" dirty="0"/>
+              <a:t>Tags such as Ringing, Not doing further education, Interested in other courses and Interested in full time MBA has a reasonable negative impact on towards the conversion</a:t>
             </a:r>
           </a:p>
           <a:p>
@@ -30763,6 +30877,1130 @@
               <a:buChar char="Ø"/>
             </a:pPr>
             <a:endParaRPr lang="en-IN" sz="2000" dirty="0"/>
+          </a:p>
+        </p:txBody>
+      </p:sp>
+      <p:sp>
+        <p:nvSpPr>
+          <p:cNvPr id="3" name="Rounded Rectangle 2">
+            <a:extLst>
+              <a:ext uri="{FF2B5EF4-FFF2-40B4-BE49-F238E27FC236}">
+                <a16:creationId xmlns:a16="http://schemas.microsoft.com/office/drawing/2014/main" id="{6AD9A9EE-A621-BC1D-2ACB-1F263EFAE631}"/>
+              </a:ext>
+            </a:extLst>
+          </p:cNvPr>
+          <p:cNvSpPr/>
+          <p:nvPr/>
+        </p:nvSpPr>
+        <p:spPr>
+          <a:xfrm>
+            <a:off x="1584960" y="4576573"/>
+            <a:ext cx="1381760" cy="457200"/>
+          </a:xfrm>
+          <a:prstGeom prst="roundRect">
+            <a:avLst/>
+          </a:prstGeom>
+          <a:solidFill>
+            <a:schemeClr val="accent5">
+              <a:lumMod val="60000"/>
+              <a:lumOff val="40000"/>
+            </a:schemeClr>
+          </a:solidFill>
+        </p:spPr>
+        <p:style>
+          <a:lnRef idx="2">
+            <a:schemeClr val="accent1">
+              <a:shade val="15000"/>
+            </a:schemeClr>
+          </a:lnRef>
+          <a:fillRef idx="1">
+            <a:schemeClr val="accent1"/>
+          </a:fillRef>
+          <a:effectRef idx="0">
+            <a:schemeClr val="accent1"/>
+          </a:effectRef>
+          <a:fontRef idx="minor">
+            <a:schemeClr val="lt1"/>
+          </a:fontRef>
+        </p:style>
+        <p:txBody>
+          <a:bodyPr rtlCol="0" anchor="ctr"/>
+          <a:lstStyle/>
+          <a:p>
+            <a:pPr algn="ctr"/>
+            <a:endParaRPr lang="en-US" sz="1400" dirty="0"/>
+          </a:p>
+        </p:txBody>
+      </p:sp>
+      <p:sp>
+        <p:nvSpPr>
+          <p:cNvPr id="4" name="Rounded Rectangle 3">
+            <a:extLst>
+              <a:ext uri="{FF2B5EF4-FFF2-40B4-BE49-F238E27FC236}">
+                <a16:creationId xmlns:a16="http://schemas.microsoft.com/office/drawing/2014/main" id="{B2A39311-EC29-358E-EEB0-84AF6931A06A}"/>
+              </a:ext>
+            </a:extLst>
+          </p:cNvPr>
+          <p:cNvSpPr/>
+          <p:nvPr/>
+        </p:nvSpPr>
+        <p:spPr>
+          <a:xfrm>
+            <a:off x="5093208" y="4592722"/>
+            <a:ext cx="1524000" cy="457200"/>
+          </a:xfrm>
+          <a:prstGeom prst="roundRect">
+            <a:avLst/>
+          </a:prstGeom>
+          <a:solidFill>
+            <a:schemeClr val="accent5">
+              <a:lumMod val="60000"/>
+              <a:lumOff val="40000"/>
+            </a:schemeClr>
+          </a:solidFill>
+        </p:spPr>
+        <p:style>
+          <a:lnRef idx="2">
+            <a:schemeClr val="accent1">
+              <a:shade val="15000"/>
+            </a:schemeClr>
+          </a:lnRef>
+          <a:fillRef idx="1">
+            <a:schemeClr val="accent1"/>
+          </a:fillRef>
+          <a:effectRef idx="0">
+            <a:schemeClr val="accent1"/>
+          </a:effectRef>
+          <a:fontRef idx="minor">
+            <a:schemeClr val="lt1"/>
+          </a:fontRef>
+        </p:style>
+        <p:txBody>
+          <a:bodyPr rtlCol="0" anchor="ctr"/>
+          <a:lstStyle/>
+          <a:p>
+            <a:pPr algn="ctr"/>
+            <a:r>
+              <a:rPr lang="en-US" sz="1400" dirty="0"/>
+              <a:t>Last Notable Activity</a:t>
+            </a:r>
+          </a:p>
+        </p:txBody>
+      </p:sp>
+      <p:sp>
+        <p:nvSpPr>
+          <p:cNvPr id="5" name="Rounded Rectangle 4">
+            <a:extLst>
+              <a:ext uri="{FF2B5EF4-FFF2-40B4-BE49-F238E27FC236}">
+                <a16:creationId xmlns:a16="http://schemas.microsoft.com/office/drawing/2014/main" id="{4A223B7D-DFA8-80B8-87AF-515DA1AE1AB6}"/>
+              </a:ext>
+            </a:extLst>
+          </p:cNvPr>
+          <p:cNvSpPr/>
+          <p:nvPr/>
+        </p:nvSpPr>
+        <p:spPr>
+          <a:xfrm>
+            <a:off x="6951472" y="4581653"/>
+            <a:ext cx="1524000" cy="457200"/>
+          </a:xfrm>
+          <a:prstGeom prst="roundRect">
+            <a:avLst/>
+          </a:prstGeom>
+          <a:solidFill>
+            <a:schemeClr val="accent5">
+              <a:lumMod val="60000"/>
+              <a:lumOff val="40000"/>
+            </a:schemeClr>
+          </a:solidFill>
+        </p:spPr>
+        <p:style>
+          <a:lnRef idx="2">
+            <a:schemeClr val="accent1">
+              <a:shade val="15000"/>
+            </a:schemeClr>
+          </a:lnRef>
+          <a:fillRef idx="1">
+            <a:schemeClr val="accent1"/>
+          </a:fillRef>
+          <a:effectRef idx="0">
+            <a:schemeClr val="accent1"/>
+          </a:effectRef>
+          <a:fontRef idx="minor">
+            <a:schemeClr val="lt1"/>
+          </a:fontRef>
+        </p:style>
+        <p:txBody>
+          <a:bodyPr rtlCol="0" anchor="ctr"/>
+          <a:lstStyle/>
+          <a:p>
+            <a:pPr algn="ctr"/>
+            <a:r>
+              <a:rPr lang="en-US" sz="1400" dirty="0"/>
+              <a:t>Last Activity</a:t>
+            </a:r>
+          </a:p>
+        </p:txBody>
+      </p:sp>
+      <p:sp>
+        <p:nvSpPr>
+          <p:cNvPr id="6" name="Rounded Rectangle 5">
+            <a:extLst>
+              <a:ext uri="{FF2B5EF4-FFF2-40B4-BE49-F238E27FC236}">
+                <a16:creationId xmlns:a16="http://schemas.microsoft.com/office/drawing/2014/main" id="{F89DFC3D-30D6-1263-471E-EF5B6090DDD6}"/>
+              </a:ext>
+            </a:extLst>
+          </p:cNvPr>
+          <p:cNvSpPr/>
+          <p:nvPr/>
+        </p:nvSpPr>
+        <p:spPr>
+          <a:xfrm>
+            <a:off x="8743696" y="4583476"/>
+            <a:ext cx="1524000" cy="457200"/>
+          </a:xfrm>
+          <a:prstGeom prst="roundRect">
+            <a:avLst/>
+          </a:prstGeom>
+          <a:solidFill>
+            <a:schemeClr val="accent5">
+              <a:lumMod val="60000"/>
+              <a:lumOff val="40000"/>
+            </a:schemeClr>
+          </a:solidFill>
+        </p:spPr>
+        <p:style>
+          <a:lnRef idx="2">
+            <a:schemeClr val="accent1">
+              <a:shade val="15000"/>
+            </a:schemeClr>
+          </a:lnRef>
+          <a:fillRef idx="1">
+            <a:schemeClr val="accent1"/>
+          </a:fillRef>
+          <a:effectRef idx="0">
+            <a:schemeClr val="accent1"/>
+          </a:effectRef>
+          <a:fontRef idx="minor">
+            <a:schemeClr val="lt1"/>
+          </a:fontRef>
+        </p:style>
+        <p:txBody>
+          <a:bodyPr rtlCol="0" anchor="ctr"/>
+          <a:lstStyle/>
+          <a:p>
+            <a:pPr algn="ctr"/>
+            <a:r>
+              <a:rPr lang="en-US" sz="1400" dirty="0"/>
+              <a:t>Lead Source</a:t>
+            </a:r>
+          </a:p>
+        </p:txBody>
+      </p:sp>
+      <p:sp>
+        <p:nvSpPr>
+          <p:cNvPr id="7" name="Rounded Rectangle 6">
+            <a:extLst>
+              <a:ext uri="{FF2B5EF4-FFF2-40B4-BE49-F238E27FC236}">
+                <a16:creationId xmlns:a16="http://schemas.microsoft.com/office/drawing/2014/main" id="{E1B06F8E-6261-02FA-05BA-A4FB289C3FD9}"/>
+              </a:ext>
+            </a:extLst>
+          </p:cNvPr>
+          <p:cNvSpPr/>
+          <p:nvPr/>
+        </p:nvSpPr>
+        <p:spPr>
+          <a:xfrm>
+            <a:off x="10544048" y="4576573"/>
+            <a:ext cx="1524000" cy="457200"/>
+          </a:xfrm>
+          <a:prstGeom prst="roundRect">
+            <a:avLst/>
+          </a:prstGeom>
+          <a:solidFill>
+            <a:schemeClr val="accent5">
+              <a:lumMod val="60000"/>
+              <a:lumOff val="40000"/>
+            </a:schemeClr>
+          </a:solidFill>
+        </p:spPr>
+        <p:style>
+          <a:lnRef idx="2">
+            <a:schemeClr val="accent1">
+              <a:shade val="15000"/>
+            </a:schemeClr>
+          </a:lnRef>
+          <a:fillRef idx="1">
+            <a:schemeClr val="accent1"/>
+          </a:fillRef>
+          <a:effectRef idx="0">
+            <a:schemeClr val="accent1"/>
+          </a:effectRef>
+          <a:fontRef idx="minor">
+            <a:schemeClr val="lt1"/>
+          </a:fontRef>
+        </p:style>
+        <p:txBody>
+          <a:bodyPr rtlCol="0" anchor="ctr"/>
+          <a:lstStyle/>
+          <a:p>
+            <a:pPr algn="ctr"/>
+            <a:r>
+              <a:rPr lang="en-US" sz="1400" dirty="0"/>
+              <a:t>Lead Origin</a:t>
+            </a:r>
+          </a:p>
+        </p:txBody>
+      </p:sp>
+      <p:sp>
+        <p:nvSpPr>
+          <p:cNvPr id="8" name="Rectangle 7">
+            <a:extLst>
+              <a:ext uri="{FF2B5EF4-FFF2-40B4-BE49-F238E27FC236}">
+                <a16:creationId xmlns:a16="http://schemas.microsoft.com/office/drawing/2014/main" id="{840CE673-86BA-BCCC-9CA6-9EC99B67DC71}"/>
+              </a:ext>
+            </a:extLst>
+          </p:cNvPr>
+          <p:cNvSpPr/>
+          <p:nvPr/>
+        </p:nvSpPr>
+        <p:spPr>
+          <a:xfrm>
+            <a:off x="460248" y="5146040"/>
+            <a:ext cx="1656080" cy="203200"/>
+          </a:xfrm>
+          <a:prstGeom prst="rect">
+            <a:avLst/>
+          </a:prstGeom>
+          <a:solidFill>
+            <a:schemeClr val="accent5"/>
+          </a:solidFill>
+        </p:spPr>
+        <p:style>
+          <a:lnRef idx="2">
+            <a:schemeClr val="accent1">
+              <a:shade val="15000"/>
+            </a:schemeClr>
+          </a:lnRef>
+          <a:fillRef idx="1">
+            <a:schemeClr val="accent1"/>
+          </a:fillRef>
+          <a:effectRef idx="0">
+            <a:schemeClr val="accent1"/>
+          </a:effectRef>
+          <a:fontRef idx="minor">
+            <a:schemeClr val="lt1"/>
+          </a:fontRef>
+        </p:style>
+        <p:txBody>
+          <a:bodyPr rtlCol="0" anchor="ctr"/>
+          <a:lstStyle/>
+          <a:p>
+            <a:pPr algn="ctr"/>
+            <a:r>
+              <a:rPr lang="en-US" sz="1000" dirty="0"/>
+              <a:t>Closed by </a:t>
+            </a:r>
+            <a:r>
+              <a:rPr lang="en-US" sz="1000" dirty="0" err="1"/>
+              <a:t>Horrizon</a:t>
+            </a:r>
+            <a:endParaRPr lang="en-US" sz="1000" dirty="0"/>
+          </a:p>
+        </p:txBody>
+      </p:sp>
+      <p:sp>
+        <p:nvSpPr>
+          <p:cNvPr id="9" name="Rectangle 8">
+            <a:extLst>
+              <a:ext uri="{FF2B5EF4-FFF2-40B4-BE49-F238E27FC236}">
+                <a16:creationId xmlns:a16="http://schemas.microsoft.com/office/drawing/2014/main" id="{652F659C-B82F-4055-0937-435480847F22}"/>
+              </a:ext>
+            </a:extLst>
+          </p:cNvPr>
+          <p:cNvSpPr/>
+          <p:nvPr/>
+        </p:nvSpPr>
+        <p:spPr>
+          <a:xfrm>
+            <a:off x="1298956" y="6598143"/>
+            <a:ext cx="2035048" cy="203200"/>
+          </a:xfrm>
+          <a:prstGeom prst="rect">
+            <a:avLst/>
+          </a:prstGeom>
+          <a:solidFill>
+            <a:srgbClr val="FFC000"/>
+          </a:solidFill>
+        </p:spPr>
+        <p:style>
+          <a:lnRef idx="2">
+            <a:schemeClr val="accent1">
+              <a:shade val="15000"/>
+            </a:schemeClr>
+          </a:lnRef>
+          <a:fillRef idx="1">
+            <a:schemeClr val="accent1"/>
+          </a:fillRef>
+          <a:effectRef idx="0">
+            <a:schemeClr val="accent1"/>
+          </a:effectRef>
+          <a:fontRef idx="minor">
+            <a:schemeClr val="lt1"/>
+          </a:fontRef>
+        </p:style>
+        <p:txBody>
+          <a:bodyPr rtlCol="0" anchor="ctr"/>
+          <a:lstStyle/>
+          <a:p>
+            <a:pPr algn="ctr"/>
+            <a:r>
+              <a:rPr lang="en-US" sz="1000" dirty="0">
+                <a:solidFill>
+                  <a:sysClr val="windowText" lastClr="000000"/>
+                </a:solidFill>
+              </a:rPr>
+              <a:t>Interested in full time MBA</a:t>
+            </a:r>
+          </a:p>
+        </p:txBody>
+      </p:sp>
+      <p:sp>
+        <p:nvSpPr>
+          <p:cNvPr id="10" name="Rectangle 9">
+            <a:extLst>
+              <a:ext uri="{FF2B5EF4-FFF2-40B4-BE49-F238E27FC236}">
+                <a16:creationId xmlns:a16="http://schemas.microsoft.com/office/drawing/2014/main" id="{4D71B034-670D-7F4E-32D1-5A60317CCD1D}"/>
+              </a:ext>
+            </a:extLst>
+          </p:cNvPr>
+          <p:cNvSpPr/>
+          <p:nvPr/>
+        </p:nvSpPr>
+        <p:spPr>
+          <a:xfrm>
+            <a:off x="2486152" y="5131604"/>
+            <a:ext cx="1656080" cy="203200"/>
+          </a:xfrm>
+          <a:prstGeom prst="rect">
+            <a:avLst/>
+          </a:prstGeom>
+          <a:solidFill>
+            <a:schemeClr val="accent5"/>
+          </a:solidFill>
+        </p:spPr>
+        <p:style>
+          <a:lnRef idx="2">
+            <a:schemeClr val="accent1">
+              <a:shade val="15000"/>
+            </a:schemeClr>
+          </a:lnRef>
+          <a:fillRef idx="1">
+            <a:schemeClr val="accent1"/>
+          </a:fillRef>
+          <a:effectRef idx="0">
+            <a:schemeClr val="accent1"/>
+          </a:effectRef>
+          <a:fontRef idx="minor">
+            <a:schemeClr val="lt1"/>
+          </a:fontRef>
+        </p:style>
+        <p:txBody>
+          <a:bodyPr rtlCol="0" anchor="ctr"/>
+          <a:lstStyle/>
+          <a:p>
+            <a:pPr algn="ctr"/>
+            <a:r>
+              <a:rPr lang="en-US" sz="1000" dirty="0"/>
+              <a:t>Lost to EINS</a:t>
+            </a:r>
+          </a:p>
+        </p:txBody>
+      </p:sp>
+      <p:sp>
+        <p:nvSpPr>
+          <p:cNvPr id="12" name="Rectangle 11">
+            <a:extLst>
+              <a:ext uri="{FF2B5EF4-FFF2-40B4-BE49-F238E27FC236}">
+                <a16:creationId xmlns:a16="http://schemas.microsoft.com/office/drawing/2014/main" id="{4B565270-2115-826C-D3D3-12E55757711B}"/>
+              </a:ext>
+            </a:extLst>
+          </p:cNvPr>
+          <p:cNvSpPr/>
+          <p:nvPr/>
+        </p:nvSpPr>
+        <p:spPr>
+          <a:xfrm>
+            <a:off x="460248" y="5712652"/>
+            <a:ext cx="1656080" cy="203200"/>
+          </a:xfrm>
+          <a:prstGeom prst="rect">
+            <a:avLst/>
+          </a:prstGeom>
+          <a:solidFill>
+            <a:srgbClr val="FFC000"/>
+          </a:solidFill>
+        </p:spPr>
+        <p:style>
+          <a:lnRef idx="2">
+            <a:schemeClr val="accent1">
+              <a:shade val="15000"/>
+            </a:schemeClr>
+          </a:lnRef>
+          <a:fillRef idx="1">
+            <a:schemeClr val="accent1"/>
+          </a:fillRef>
+          <a:effectRef idx="0">
+            <a:schemeClr val="accent1"/>
+          </a:effectRef>
+          <a:fontRef idx="minor">
+            <a:schemeClr val="lt1"/>
+          </a:fontRef>
+        </p:style>
+        <p:txBody>
+          <a:bodyPr rtlCol="0" anchor="ctr"/>
+          <a:lstStyle/>
+          <a:p>
+            <a:pPr algn="ctr"/>
+            <a:r>
+              <a:rPr lang="en-US" sz="1000" dirty="0">
+                <a:solidFill>
+                  <a:sysClr val="windowText" lastClr="000000"/>
+                </a:solidFill>
+              </a:rPr>
+              <a:t>Already a student</a:t>
+            </a:r>
+          </a:p>
+        </p:txBody>
+      </p:sp>
+      <p:sp>
+        <p:nvSpPr>
+          <p:cNvPr id="13" name="Rectangle 12">
+            <a:extLst>
+              <a:ext uri="{FF2B5EF4-FFF2-40B4-BE49-F238E27FC236}">
+                <a16:creationId xmlns:a16="http://schemas.microsoft.com/office/drawing/2014/main" id="{BF0F0FC7-AA57-5253-8564-B0FAF16204C9}"/>
+              </a:ext>
+            </a:extLst>
+          </p:cNvPr>
+          <p:cNvSpPr/>
+          <p:nvPr/>
+        </p:nvSpPr>
+        <p:spPr>
+          <a:xfrm>
+            <a:off x="1329436" y="5390669"/>
+            <a:ext cx="2035048" cy="203200"/>
+          </a:xfrm>
+          <a:prstGeom prst="rect">
+            <a:avLst/>
+          </a:prstGeom>
+          <a:solidFill>
+            <a:schemeClr val="accent5"/>
+          </a:solidFill>
+        </p:spPr>
+        <p:style>
+          <a:lnRef idx="2">
+            <a:schemeClr val="accent1">
+              <a:shade val="15000"/>
+            </a:schemeClr>
+          </a:lnRef>
+          <a:fillRef idx="1">
+            <a:schemeClr val="accent1"/>
+          </a:fillRef>
+          <a:effectRef idx="0">
+            <a:schemeClr val="accent1"/>
+          </a:effectRef>
+          <a:fontRef idx="minor">
+            <a:schemeClr val="lt1"/>
+          </a:fontRef>
+        </p:style>
+        <p:txBody>
+          <a:bodyPr rtlCol="0" anchor="ctr"/>
+          <a:lstStyle/>
+          <a:p>
+            <a:pPr algn="ctr"/>
+            <a:r>
+              <a:rPr lang="en-US" sz="1000" dirty="0"/>
+              <a:t>Will revert after reading the email</a:t>
+            </a:r>
+          </a:p>
+        </p:txBody>
+      </p:sp>
+      <p:sp>
+        <p:nvSpPr>
+          <p:cNvPr id="14" name="Rectangle 13">
+            <a:extLst>
+              <a:ext uri="{FF2B5EF4-FFF2-40B4-BE49-F238E27FC236}">
+                <a16:creationId xmlns:a16="http://schemas.microsoft.com/office/drawing/2014/main" id="{46749835-01D8-5F61-012A-5916EA44C2E1}"/>
+              </a:ext>
+            </a:extLst>
+          </p:cNvPr>
+          <p:cNvSpPr/>
+          <p:nvPr/>
+        </p:nvSpPr>
+        <p:spPr>
+          <a:xfrm>
+            <a:off x="2346960" y="5699498"/>
+            <a:ext cx="1656080" cy="203200"/>
+          </a:xfrm>
+          <a:prstGeom prst="rect">
+            <a:avLst/>
+          </a:prstGeom>
+          <a:solidFill>
+            <a:srgbClr val="FFC000"/>
+          </a:solidFill>
+        </p:spPr>
+        <p:style>
+          <a:lnRef idx="2">
+            <a:schemeClr val="accent1">
+              <a:shade val="15000"/>
+            </a:schemeClr>
+          </a:lnRef>
+          <a:fillRef idx="1">
+            <a:schemeClr val="accent1"/>
+          </a:fillRef>
+          <a:effectRef idx="0">
+            <a:schemeClr val="accent1"/>
+          </a:effectRef>
+          <a:fontRef idx="minor">
+            <a:schemeClr val="lt1"/>
+          </a:fontRef>
+        </p:style>
+        <p:txBody>
+          <a:bodyPr rtlCol="0" anchor="ctr"/>
+          <a:lstStyle/>
+          <a:p>
+            <a:pPr algn="ctr"/>
+            <a:r>
+              <a:rPr lang="en-US" sz="1000" dirty="0">
+                <a:solidFill>
+                  <a:sysClr val="windowText" lastClr="000000"/>
+                </a:solidFill>
+              </a:rPr>
+              <a:t>Switched off</a:t>
+            </a:r>
+          </a:p>
+        </p:txBody>
+      </p:sp>
+      <p:sp>
+        <p:nvSpPr>
+          <p:cNvPr id="15" name="Rectangle 14">
+            <a:extLst>
+              <a:ext uri="{FF2B5EF4-FFF2-40B4-BE49-F238E27FC236}">
+                <a16:creationId xmlns:a16="http://schemas.microsoft.com/office/drawing/2014/main" id="{D77C3712-DE48-3F6E-67ED-F9EA8D5B8F95}"/>
+              </a:ext>
+            </a:extLst>
+          </p:cNvPr>
+          <p:cNvSpPr/>
+          <p:nvPr/>
+        </p:nvSpPr>
+        <p:spPr>
+          <a:xfrm>
+            <a:off x="460248" y="6034909"/>
+            <a:ext cx="1656080" cy="203200"/>
+          </a:xfrm>
+          <a:prstGeom prst="rect">
+            <a:avLst/>
+          </a:prstGeom>
+          <a:solidFill>
+            <a:srgbClr val="FFC000"/>
+          </a:solidFill>
+        </p:spPr>
+        <p:style>
+          <a:lnRef idx="2">
+            <a:schemeClr val="accent1">
+              <a:shade val="15000"/>
+            </a:schemeClr>
+          </a:lnRef>
+          <a:fillRef idx="1">
+            <a:schemeClr val="accent1"/>
+          </a:fillRef>
+          <a:effectRef idx="0">
+            <a:schemeClr val="accent1"/>
+          </a:effectRef>
+          <a:fontRef idx="minor">
+            <a:schemeClr val="lt1"/>
+          </a:fontRef>
+        </p:style>
+        <p:txBody>
+          <a:bodyPr rtlCol="0" anchor="ctr"/>
+          <a:lstStyle/>
+          <a:p>
+            <a:pPr algn="ctr"/>
+            <a:r>
+              <a:rPr lang="en-US" sz="1000" dirty="0">
+                <a:solidFill>
+                  <a:sysClr val="windowText" lastClr="000000"/>
+                </a:solidFill>
+              </a:rPr>
+              <a:t>Invalid Number</a:t>
+            </a:r>
+          </a:p>
+        </p:txBody>
+      </p:sp>
+      <p:sp>
+        <p:nvSpPr>
+          <p:cNvPr id="16" name="Rectangle 15">
+            <a:extLst>
+              <a:ext uri="{FF2B5EF4-FFF2-40B4-BE49-F238E27FC236}">
+                <a16:creationId xmlns:a16="http://schemas.microsoft.com/office/drawing/2014/main" id="{C608D9A6-7EA5-4D48-8654-BEB30D7EEAEE}"/>
+              </a:ext>
+            </a:extLst>
+          </p:cNvPr>
+          <p:cNvSpPr/>
+          <p:nvPr/>
+        </p:nvSpPr>
+        <p:spPr>
+          <a:xfrm>
+            <a:off x="2346960" y="6018758"/>
+            <a:ext cx="1656080" cy="203200"/>
+          </a:xfrm>
+          <a:prstGeom prst="rect">
+            <a:avLst/>
+          </a:prstGeom>
+          <a:solidFill>
+            <a:srgbClr val="FFC000"/>
+          </a:solidFill>
+        </p:spPr>
+        <p:style>
+          <a:lnRef idx="2">
+            <a:schemeClr val="accent1">
+              <a:shade val="15000"/>
+            </a:schemeClr>
+          </a:lnRef>
+          <a:fillRef idx="1">
+            <a:schemeClr val="accent1"/>
+          </a:fillRef>
+          <a:effectRef idx="0">
+            <a:schemeClr val="accent1"/>
+          </a:effectRef>
+          <a:fontRef idx="minor">
+            <a:schemeClr val="lt1"/>
+          </a:fontRef>
+        </p:style>
+        <p:txBody>
+          <a:bodyPr rtlCol="0" anchor="ctr"/>
+          <a:lstStyle/>
+          <a:p>
+            <a:pPr algn="ctr"/>
+            <a:r>
+              <a:rPr lang="en-US" sz="1000" dirty="0">
+                <a:solidFill>
+                  <a:sysClr val="windowText" lastClr="000000"/>
+                </a:solidFill>
+              </a:rPr>
+              <a:t>Ringing</a:t>
+            </a:r>
+          </a:p>
+        </p:txBody>
+      </p:sp>
+      <p:sp>
+        <p:nvSpPr>
+          <p:cNvPr id="17" name="Rectangle 16">
+            <a:extLst>
+              <a:ext uri="{FF2B5EF4-FFF2-40B4-BE49-F238E27FC236}">
+                <a16:creationId xmlns:a16="http://schemas.microsoft.com/office/drawing/2014/main" id="{92FC502C-B468-0B16-FE0A-3949ECDFCFA2}"/>
+              </a:ext>
+            </a:extLst>
+          </p:cNvPr>
+          <p:cNvSpPr/>
+          <p:nvPr/>
+        </p:nvSpPr>
+        <p:spPr>
+          <a:xfrm>
+            <a:off x="460248" y="6347006"/>
+            <a:ext cx="1656080" cy="203200"/>
+          </a:xfrm>
+          <a:prstGeom prst="rect">
+            <a:avLst/>
+          </a:prstGeom>
+          <a:solidFill>
+            <a:srgbClr val="FFC000"/>
+          </a:solidFill>
+        </p:spPr>
+        <p:style>
+          <a:lnRef idx="2">
+            <a:schemeClr val="accent1">
+              <a:shade val="15000"/>
+            </a:schemeClr>
+          </a:lnRef>
+          <a:fillRef idx="1">
+            <a:schemeClr val="accent1"/>
+          </a:fillRef>
+          <a:effectRef idx="0">
+            <a:schemeClr val="accent1"/>
+          </a:effectRef>
+          <a:fontRef idx="minor">
+            <a:schemeClr val="lt1"/>
+          </a:fontRef>
+        </p:style>
+        <p:txBody>
+          <a:bodyPr rtlCol="0" anchor="ctr"/>
+          <a:lstStyle/>
+          <a:p>
+            <a:pPr algn="ctr"/>
+            <a:r>
+              <a:rPr lang="en-US" sz="1000" dirty="0">
+                <a:solidFill>
+                  <a:sysClr val="windowText" lastClr="000000"/>
+                </a:solidFill>
+              </a:rPr>
+              <a:t>Not doing further education</a:t>
+            </a:r>
+          </a:p>
+        </p:txBody>
+      </p:sp>
+      <p:sp>
+        <p:nvSpPr>
+          <p:cNvPr id="18" name="Rectangle 17">
+            <a:extLst>
+              <a:ext uri="{FF2B5EF4-FFF2-40B4-BE49-F238E27FC236}">
+                <a16:creationId xmlns:a16="http://schemas.microsoft.com/office/drawing/2014/main" id="{A8C8F827-B86C-AE0B-857C-90B7C74CDDE3}"/>
+              </a:ext>
+            </a:extLst>
+          </p:cNvPr>
+          <p:cNvSpPr/>
+          <p:nvPr/>
+        </p:nvSpPr>
+        <p:spPr>
+          <a:xfrm>
+            <a:off x="2346960" y="6351309"/>
+            <a:ext cx="1656080" cy="203200"/>
+          </a:xfrm>
+          <a:prstGeom prst="rect">
+            <a:avLst/>
+          </a:prstGeom>
+          <a:solidFill>
+            <a:srgbClr val="FFC000"/>
+          </a:solidFill>
+        </p:spPr>
+        <p:style>
+          <a:lnRef idx="2">
+            <a:schemeClr val="accent1">
+              <a:shade val="15000"/>
+            </a:schemeClr>
+          </a:lnRef>
+          <a:fillRef idx="1">
+            <a:schemeClr val="accent1"/>
+          </a:fillRef>
+          <a:effectRef idx="0">
+            <a:schemeClr val="accent1"/>
+          </a:effectRef>
+          <a:fontRef idx="minor">
+            <a:schemeClr val="lt1"/>
+          </a:fontRef>
+        </p:style>
+        <p:txBody>
+          <a:bodyPr rtlCol="0" anchor="ctr"/>
+          <a:lstStyle/>
+          <a:p>
+            <a:pPr algn="ctr"/>
+            <a:r>
+              <a:rPr lang="en-US" sz="1000" dirty="0">
+                <a:solidFill>
+                  <a:sysClr val="windowText" lastClr="000000"/>
+                </a:solidFill>
+              </a:rPr>
+              <a:t>Interested in other courses</a:t>
+            </a:r>
+          </a:p>
+        </p:txBody>
+      </p:sp>
+      <p:sp>
+        <p:nvSpPr>
+          <p:cNvPr id="19" name="Rectangle 18">
+            <a:extLst>
+              <a:ext uri="{FF2B5EF4-FFF2-40B4-BE49-F238E27FC236}">
+                <a16:creationId xmlns:a16="http://schemas.microsoft.com/office/drawing/2014/main" id="{5B7E4BC3-D34E-74D6-B2F0-B0F3E247C54D}"/>
+              </a:ext>
+            </a:extLst>
+          </p:cNvPr>
+          <p:cNvSpPr/>
+          <p:nvPr/>
+        </p:nvSpPr>
+        <p:spPr>
+          <a:xfrm>
+            <a:off x="5027168" y="5363045"/>
+            <a:ext cx="1656080" cy="203200"/>
+          </a:xfrm>
+          <a:prstGeom prst="rect">
+            <a:avLst/>
+          </a:prstGeom>
+          <a:solidFill>
+            <a:schemeClr val="accent5"/>
+          </a:solidFill>
+        </p:spPr>
+        <p:style>
+          <a:lnRef idx="2">
+            <a:schemeClr val="accent1">
+              <a:shade val="15000"/>
+            </a:schemeClr>
+          </a:lnRef>
+          <a:fillRef idx="1">
+            <a:schemeClr val="accent1"/>
+          </a:fillRef>
+          <a:effectRef idx="0">
+            <a:schemeClr val="accent1"/>
+          </a:effectRef>
+          <a:fontRef idx="minor">
+            <a:schemeClr val="lt1"/>
+          </a:fontRef>
+        </p:style>
+        <p:txBody>
+          <a:bodyPr rtlCol="0" anchor="ctr"/>
+          <a:lstStyle/>
+          <a:p>
+            <a:pPr algn="ctr"/>
+            <a:r>
+              <a:rPr lang="en-US" sz="1000" dirty="0"/>
+              <a:t>Modified</a:t>
+            </a:r>
+          </a:p>
+        </p:txBody>
+      </p:sp>
+      <p:sp>
+        <p:nvSpPr>
+          <p:cNvPr id="20" name="Rectangle 19">
+            <a:extLst>
+              <a:ext uri="{FF2B5EF4-FFF2-40B4-BE49-F238E27FC236}">
+                <a16:creationId xmlns:a16="http://schemas.microsoft.com/office/drawing/2014/main" id="{13E25B0F-494B-58E2-42F9-02485A9BD8C4}"/>
+              </a:ext>
+            </a:extLst>
+          </p:cNvPr>
+          <p:cNvSpPr/>
+          <p:nvPr/>
+        </p:nvSpPr>
+        <p:spPr>
+          <a:xfrm>
+            <a:off x="6885432" y="5349240"/>
+            <a:ext cx="1656080" cy="203200"/>
+          </a:xfrm>
+          <a:prstGeom prst="rect">
+            <a:avLst/>
+          </a:prstGeom>
+          <a:solidFill>
+            <a:schemeClr val="accent5"/>
+          </a:solidFill>
+        </p:spPr>
+        <p:style>
+          <a:lnRef idx="2">
+            <a:schemeClr val="accent1">
+              <a:shade val="15000"/>
+            </a:schemeClr>
+          </a:lnRef>
+          <a:fillRef idx="1">
+            <a:schemeClr val="accent1"/>
+          </a:fillRef>
+          <a:effectRef idx="0">
+            <a:schemeClr val="accent1"/>
+          </a:effectRef>
+          <a:fontRef idx="minor">
+            <a:schemeClr val="lt1"/>
+          </a:fontRef>
+        </p:style>
+        <p:txBody>
+          <a:bodyPr rtlCol="0" anchor="ctr"/>
+          <a:lstStyle/>
+          <a:p>
+            <a:pPr algn="ctr"/>
+            <a:r>
+              <a:rPr lang="en-US" sz="1000" dirty="0"/>
+              <a:t>SMS Sent</a:t>
+            </a:r>
+          </a:p>
+        </p:txBody>
+      </p:sp>
+      <p:sp>
+        <p:nvSpPr>
+          <p:cNvPr id="21" name="Rectangle 20">
+            <a:extLst>
+              <a:ext uri="{FF2B5EF4-FFF2-40B4-BE49-F238E27FC236}">
+                <a16:creationId xmlns:a16="http://schemas.microsoft.com/office/drawing/2014/main" id="{A24D92BA-A2C7-B5AE-23B9-A6A35310898E}"/>
+              </a:ext>
+            </a:extLst>
+          </p:cNvPr>
+          <p:cNvSpPr/>
+          <p:nvPr/>
+        </p:nvSpPr>
+        <p:spPr>
+          <a:xfrm>
+            <a:off x="8677656" y="5318760"/>
+            <a:ext cx="1656080" cy="203200"/>
+          </a:xfrm>
+          <a:prstGeom prst="rect">
+            <a:avLst/>
+          </a:prstGeom>
+          <a:solidFill>
+            <a:schemeClr val="accent5"/>
+          </a:solidFill>
+        </p:spPr>
+        <p:style>
+          <a:lnRef idx="2">
+            <a:schemeClr val="accent1">
+              <a:shade val="15000"/>
+            </a:schemeClr>
+          </a:lnRef>
+          <a:fillRef idx="1">
+            <a:schemeClr val="accent1"/>
+          </a:fillRef>
+          <a:effectRef idx="0">
+            <a:schemeClr val="accent1"/>
+          </a:effectRef>
+          <a:fontRef idx="minor">
+            <a:schemeClr val="lt1"/>
+          </a:fontRef>
+        </p:style>
+        <p:txBody>
+          <a:bodyPr rtlCol="0" anchor="ctr"/>
+          <a:lstStyle/>
+          <a:p>
+            <a:pPr algn="ctr"/>
+            <a:r>
+              <a:rPr lang="en-US" sz="1000" dirty="0" err="1"/>
+              <a:t>Welingak</a:t>
+            </a:r>
+            <a:r>
+              <a:rPr lang="en-US" sz="1000" dirty="0"/>
+              <a:t> Website</a:t>
+            </a:r>
+          </a:p>
+        </p:txBody>
+      </p:sp>
+      <p:sp>
+        <p:nvSpPr>
+          <p:cNvPr id="22" name="Rectangle 21">
+            <a:extLst>
+              <a:ext uri="{FF2B5EF4-FFF2-40B4-BE49-F238E27FC236}">
+                <a16:creationId xmlns:a16="http://schemas.microsoft.com/office/drawing/2014/main" id="{06D2D0E9-8374-E714-D4D6-9D2E1F5D5611}"/>
+              </a:ext>
+            </a:extLst>
+          </p:cNvPr>
+          <p:cNvSpPr/>
+          <p:nvPr/>
+        </p:nvSpPr>
+        <p:spPr>
+          <a:xfrm>
+            <a:off x="10478008" y="5318760"/>
+            <a:ext cx="1656080" cy="203200"/>
+          </a:xfrm>
+          <a:prstGeom prst="rect">
+            <a:avLst/>
+          </a:prstGeom>
+          <a:solidFill>
+            <a:schemeClr val="accent5"/>
+          </a:solidFill>
+        </p:spPr>
+        <p:style>
+          <a:lnRef idx="2">
+            <a:schemeClr val="accent1">
+              <a:shade val="15000"/>
+            </a:schemeClr>
+          </a:lnRef>
+          <a:fillRef idx="1">
+            <a:schemeClr val="accent1"/>
+          </a:fillRef>
+          <a:effectRef idx="0">
+            <a:schemeClr val="accent1"/>
+          </a:effectRef>
+          <a:fontRef idx="minor">
+            <a:schemeClr val="lt1"/>
+          </a:fontRef>
+        </p:style>
+        <p:txBody>
+          <a:bodyPr rtlCol="0" anchor="ctr"/>
+          <a:lstStyle/>
+          <a:p>
+            <a:pPr algn="ctr"/>
+            <a:r>
+              <a:rPr lang="en-US" sz="1000" dirty="0"/>
+              <a:t>Lead Add forms</a:t>
+            </a:r>
+          </a:p>
+        </p:txBody>
+      </p:sp>
+      <p:sp>
+        <p:nvSpPr>
+          <p:cNvPr id="23" name="Rounded Rectangle 22">
+            <a:extLst>
+              <a:ext uri="{FF2B5EF4-FFF2-40B4-BE49-F238E27FC236}">
+                <a16:creationId xmlns:a16="http://schemas.microsoft.com/office/drawing/2014/main" id="{CBCDB274-1D89-2F2B-BCB0-78E3108A5ACE}"/>
+              </a:ext>
+            </a:extLst>
+          </p:cNvPr>
+          <p:cNvSpPr/>
+          <p:nvPr/>
+        </p:nvSpPr>
+        <p:spPr>
+          <a:xfrm>
+            <a:off x="1924304" y="4576573"/>
+            <a:ext cx="1042416" cy="457200"/>
+          </a:xfrm>
+          <a:prstGeom prst="roundRect">
+            <a:avLst/>
+          </a:prstGeom>
+          <a:solidFill>
+            <a:srgbClr val="FFC000"/>
+          </a:solidFill>
+          <a:ln>
+            <a:noFill/>
+          </a:ln>
+        </p:spPr>
+        <p:style>
+          <a:lnRef idx="2">
+            <a:schemeClr val="accent1">
+              <a:shade val="15000"/>
+            </a:schemeClr>
+          </a:lnRef>
+          <a:fillRef idx="1">
+            <a:schemeClr val="accent1"/>
+          </a:fillRef>
+          <a:effectRef idx="0">
+            <a:schemeClr val="accent1"/>
+          </a:effectRef>
+          <a:fontRef idx="minor">
+            <a:schemeClr val="lt1"/>
+          </a:fontRef>
+        </p:style>
+        <p:txBody>
+          <a:bodyPr rtlCol="0" anchor="ctr"/>
+          <a:lstStyle/>
+          <a:p>
+            <a:pPr algn="ctr"/>
+            <a:endParaRPr lang="en-US" sz="1400" dirty="0"/>
+          </a:p>
+        </p:txBody>
+      </p:sp>
+      <p:sp>
+        <p:nvSpPr>
+          <p:cNvPr id="24" name="TextBox 23">
+            <a:extLst>
+              <a:ext uri="{FF2B5EF4-FFF2-40B4-BE49-F238E27FC236}">
+                <a16:creationId xmlns:a16="http://schemas.microsoft.com/office/drawing/2014/main" id="{375C04BF-2044-B90C-63DC-FF9449E26F58}"/>
+              </a:ext>
+            </a:extLst>
+          </p:cNvPr>
+          <p:cNvSpPr txBox="1"/>
+          <p:nvPr/>
+        </p:nvSpPr>
+        <p:spPr>
+          <a:xfrm>
+            <a:off x="1965960" y="4633229"/>
+            <a:ext cx="619760" cy="307777"/>
+          </a:xfrm>
+          <a:prstGeom prst="rect">
+            <a:avLst/>
+          </a:prstGeom>
+          <a:noFill/>
+        </p:spPr>
+        <p:txBody>
+          <a:bodyPr wrap="square" rtlCol="0">
+            <a:spAutoFit/>
+          </a:bodyPr>
+          <a:lstStyle/>
+          <a:p>
+            <a:r>
+              <a:rPr lang="en-US" sz="1400" dirty="0"/>
+              <a:t>Tags</a:t>
+            </a:r>
           </a:p>
         </p:txBody>
       </p:sp>

</xml_diff>

<commit_message>
Modified PPT and PDF with some corrections
</commit_message>
<xml_diff>
--- a/Lead Scoring Assignment.pptx
+++ b/Lead Scoring Assignment.pptx
@@ -25325,7 +25325,7 @@
           <p:nvPr>
             <p:extLst>
               <p:ext uri="{D42A27DB-BD31-4B8C-83A1-F6EECF244321}">
-                <p14:modId xmlns:p14="http://schemas.microsoft.com/office/powerpoint/2010/main" val="842347092"/>
+                <p14:modId xmlns:p14="http://schemas.microsoft.com/office/powerpoint/2010/main" val="3987322186"/>
               </p:ext>
             </p:extLst>
           </p:nvPr>
@@ -25536,12 +25536,12 @@
                     <a:p>
                       <a:pPr algn="ctr" fontAlgn="b"/>
                       <a:r>
-                        <a:rPr lang="en-IN" sz="1200" u="none" strike="noStrike">
+                        <a:rPr lang="en-IN" sz="1200" u="none" strike="noStrike" dirty="0">
                           <a:effectLst/>
                         </a:rPr>
                         <a:t>0</a:t>
                       </a:r>
-                      <a:endParaRPr lang="en-IN" sz="1200" b="0" i="0" u="none" strike="noStrike">
+                      <a:endParaRPr lang="en-IN" sz="1200" b="0" i="0" u="none" strike="noStrike" dirty="0">
                         <a:solidFill>
                           <a:srgbClr val="000000"/>
                         </a:solidFill>
@@ -25557,20 +25557,19 @@
                     <a:bodyPr/>
                     <a:lstStyle/>
                     <a:p>
-                      <a:pPr algn="ctr" fontAlgn="b"/>
+                      <a:pPr marL="0" algn="ctr" defTabSz="914400" rtl="0" eaLnBrk="1" fontAlgn="b" latinLnBrk="0" hangingPunct="1"/>
                       <a:r>
-                        <a:rPr lang="en-IN" sz="1200" u="none" strike="noStrike">
+                        <a:rPr lang="en-IN" sz="1200" u="none" strike="noStrike" kern="1200" dirty="0">
+                          <a:solidFill>
+                            <a:schemeClr val="dk1"/>
+                          </a:solidFill>
                           <a:effectLst/>
+                          <a:latin typeface="+mn-lt"/>
+                          <a:ea typeface="+mn-ea"/>
+                          <a:cs typeface="+mn-cs"/>
                         </a:rPr>
-                        <a:t>1.17</a:t>
+                        <a:t>1.05</a:t>
                       </a:r>
-                      <a:endParaRPr lang="en-IN" sz="1200" b="0" i="0" u="none" strike="noStrike">
-                        <a:solidFill>
-                          <a:srgbClr val="000000"/>
-                        </a:solidFill>
-                        <a:effectLst/>
-                        <a:latin typeface="Calibri Light" panose="020F0302020204030204" pitchFamily="34" charset="0"/>
-                      </a:endParaRPr>
                     </a:p>
                   </a:txBody>
                   <a:tcPr marL="9525" marR="9525" marT="9525" marB="0" anchor="b"/>
@@ -25580,20 +25579,19 @@
                     <a:bodyPr/>
                     <a:lstStyle/>
                     <a:p>
-                      <a:pPr algn="ctr" fontAlgn="b"/>
+                      <a:pPr marL="0" algn="ctr" defTabSz="914400" rtl="0" eaLnBrk="1" fontAlgn="b" latinLnBrk="0" hangingPunct="1"/>
                       <a:r>
-                        <a:rPr lang="en-IN" sz="1200" u="none" strike="noStrike" dirty="0">
+                        <a:rPr lang="en-IN" sz="1200" u="none" strike="noStrike" kern="1200" dirty="0">
+                          <a:solidFill>
+                            <a:schemeClr val="dk1"/>
+                          </a:solidFill>
                           <a:effectLst/>
+                          <a:latin typeface="+mn-lt"/>
+                          <a:ea typeface="+mn-ea"/>
+                          <a:cs typeface="+mn-cs"/>
                         </a:rPr>
-                        <a:t>7.7505</a:t>
+                        <a:t>8.0130</a:t>
                       </a:r>
-                      <a:endParaRPr lang="en-IN" sz="1200" b="0" i="0" u="none" strike="noStrike" dirty="0">
-                        <a:solidFill>
-                          <a:srgbClr val="000000"/>
-                        </a:solidFill>
-                        <a:effectLst/>
-                        <a:latin typeface="Calibri Light" panose="020F0302020204030204" pitchFamily="34" charset="0"/>
-                      </a:endParaRPr>
                     </a:p>
                   </a:txBody>
                   <a:tcPr marL="9525" marR="9525" marT="9525" marB="0" anchor="b"/>
@@ -25658,12 +25656,12 @@
                     <a:p>
                       <a:pPr algn="ctr" fontAlgn="b"/>
                       <a:r>
-                        <a:rPr lang="en-IN" sz="1200" u="none" strike="noStrike">
+                        <a:rPr lang="en-IN" sz="1200" u="none" strike="noStrike" dirty="0">
                           <a:effectLst/>
                         </a:rPr>
                         <a:t>0</a:t>
                       </a:r>
-                      <a:endParaRPr lang="en-IN" sz="1200" b="0" i="0" u="none" strike="noStrike">
+                      <a:endParaRPr lang="en-IN" sz="1200" b="0" i="0" u="none" strike="noStrike" dirty="0">
                         <a:solidFill>
                           <a:srgbClr val="000000"/>
                         </a:solidFill>
@@ -25679,20 +25677,19 @@
                     <a:bodyPr/>
                     <a:lstStyle/>
                     <a:p>
-                      <a:pPr algn="ctr" fontAlgn="b"/>
+                      <a:pPr marL="0" algn="ctr" defTabSz="914400" rtl="0" eaLnBrk="1" fontAlgn="b" latinLnBrk="0" hangingPunct="1"/>
                       <a:r>
-                        <a:rPr lang="en-IN" sz="1200" u="none" strike="noStrike">
+                        <a:rPr lang="en-IN" sz="1200" u="none" strike="noStrike" kern="1200" dirty="0">
+                          <a:solidFill>
+                            <a:schemeClr val="dk1"/>
+                          </a:solidFill>
                           <a:effectLst/>
+                          <a:latin typeface="+mn-lt"/>
+                          <a:ea typeface="+mn-ea"/>
+                          <a:cs typeface="+mn-cs"/>
                         </a:rPr>
-                        <a:t>1.04</a:t>
+                        <a:t>1.03</a:t>
                       </a:r>
-                      <a:endParaRPr lang="en-IN" sz="1200" b="0" i="0" u="none" strike="noStrike">
-                        <a:solidFill>
-                          <a:srgbClr val="000000"/>
-                        </a:solidFill>
-                        <a:effectLst/>
-                        <a:latin typeface="Calibri Light" panose="020F0302020204030204" pitchFamily="34" charset="0"/>
-                      </a:endParaRPr>
                     </a:p>
                   </a:txBody>
                   <a:tcPr marL="9525" marR="9525" marT="9525" marB="0" anchor="b"/>
@@ -25704,12 +25701,12 @@
                     <a:p>
                       <a:pPr algn="ctr" fontAlgn="b"/>
                       <a:r>
-                        <a:rPr lang="en-IN" sz="1200" u="none" strike="noStrike">
+                        <a:rPr lang="en-IN" sz="1200" u="none" strike="noStrike" dirty="0">
                           <a:effectLst/>
                         </a:rPr>
-                        <a:t>6.6826</a:t>
+                        <a:t>6.7208</a:t>
                       </a:r>
-                      <a:endParaRPr lang="en-IN" sz="1200" b="0" i="0" u="none" strike="noStrike">
+                      <a:endParaRPr lang="en-IN" sz="1200" b="0" i="0" u="none" strike="noStrike" dirty="0">
                         <a:solidFill>
                           <a:srgbClr val="000000"/>
                         </a:solidFill>
@@ -25801,20 +25798,19 @@
                     <a:bodyPr/>
                     <a:lstStyle/>
                     <a:p>
-                      <a:pPr algn="ctr" fontAlgn="b"/>
+                      <a:pPr marL="0" algn="ctr" defTabSz="914400" rtl="0" eaLnBrk="1" fontAlgn="b" latinLnBrk="0" hangingPunct="1"/>
                       <a:r>
-                        <a:rPr lang="en-IN" sz="1200" u="none" strike="noStrike" dirty="0">
+                        <a:rPr lang="en-IN" sz="1200" u="none" strike="noStrike" kern="1200" dirty="0">
+                          <a:solidFill>
+                            <a:schemeClr val="dk1"/>
+                          </a:solidFill>
                           <a:effectLst/>
+                          <a:latin typeface="+mn-lt"/>
+                          <a:ea typeface="+mn-ea"/>
+                          <a:cs typeface="+mn-cs"/>
                         </a:rPr>
                         <a:t>0.04</a:t>
                       </a:r>
-                      <a:endParaRPr lang="en-IN" sz="1200" b="0" i="0" u="none" strike="noStrike" dirty="0">
-                        <a:solidFill>
-                          <a:srgbClr val="000000"/>
-                        </a:solidFill>
-                        <a:effectLst/>
-                        <a:latin typeface="Calibri Light" panose="020F0302020204030204" pitchFamily="34" charset="0"/>
-                      </a:endParaRPr>
                     </a:p>
                   </a:txBody>
                   <a:tcPr marL="9525" marR="9525" marT="9525" marB="0" anchor="b"/>
@@ -25826,12 +25822,12 @@
                     <a:p>
                       <a:pPr algn="ctr" fontAlgn="b"/>
                       <a:r>
-                        <a:rPr lang="en-IN" sz="1200" u="none" strike="noStrike">
+                        <a:rPr lang="en-IN" sz="1200" u="none" strike="noStrike" dirty="0">
                           <a:effectLst/>
                         </a:rPr>
-                        <a:t>4.889</a:t>
+                        <a:t>4.9413</a:t>
                       </a:r>
-                      <a:endParaRPr lang="en-IN" sz="1200" b="0" i="0" u="none" strike="noStrike">
+                      <a:endParaRPr lang="en-IN" sz="1200" b="0" i="0" u="none" strike="noStrike" dirty="0">
                         <a:solidFill>
                           <a:srgbClr val="000000"/>
                         </a:solidFill>
@@ -25879,64 +25875,18 @@
                     <a:p>
                       <a:pPr algn="l" fontAlgn="b"/>
                       <a:r>
+                        <a:rPr lang="en-IN" sz="1200" u="none" strike="noStrike" dirty="0" err="1">
+                          <a:effectLst/>
+                        </a:rPr>
+                        <a:t>Tags_Already</a:t>
+                      </a:r>
+                      <a:r>
                         <a:rPr lang="en-IN" sz="1200" u="none" strike="noStrike" dirty="0">
                           <a:effectLst/>
                         </a:rPr>
-                        <a:t>Last Notable </a:t>
-                      </a:r>
-                      <a:r>
-                        <a:rPr lang="en-IN" sz="1200" u="none" strike="noStrike" dirty="0" err="1">
-                          <a:effectLst/>
-                        </a:rPr>
-                        <a:t>Activity_Modified</a:t>
+                        <a:t> a student</a:t>
                       </a:r>
                       <a:endParaRPr lang="en-IN" sz="1200" b="0" i="0" u="none" strike="noStrike" dirty="0">
-                        <a:solidFill>
-                          <a:srgbClr val="000000"/>
-                        </a:solidFill>
-                        <a:effectLst/>
-                        <a:latin typeface="Calibri Light" panose="020F0302020204030204" pitchFamily="34" charset="0"/>
-                      </a:endParaRPr>
-                    </a:p>
-                  </a:txBody>
-                  <a:tcPr marL="9525" marR="9525" marT="9525" marB="0" anchor="b"/>
-                </a:tc>
-                <a:tc>
-                  <a:txBody>
-                    <a:bodyPr/>
-                    <a:lstStyle/>
-                    <a:p>
-                      <a:pPr algn="ctr" fontAlgn="b"/>
-                      <a:r>
-                        <a:rPr lang="en-IN" sz="1200" u="none" strike="noStrike">
-                          <a:effectLst/>
-                        </a:rPr>
-                        <a:t>0</a:t>
-                      </a:r>
-                      <a:endParaRPr lang="en-IN" sz="1200" b="0" i="0" u="none" strike="noStrike">
-                        <a:solidFill>
-                          <a:srgbClr val="000000"/>
-                        </a:solidFill>
-                        <a:effectLst/>
-                        <a:latin typeface="Calibri Light" panose="020F0302020204030204" pitchFamily="34" charset="0"/>
-                      </a:endParaRPr>
-                    </a:p>
-                  </a:txBody>
-                  <a:tcPr marL="9525" marR="9525" marT="9525" marB="0" anchor="b"/>
-                </a:tc>
-                <a:tc>
-                  <a:txBody>
-                    <a:bodyPr/>
-                    <a:lstStyle/>
-                    <a:p>
-                      <a:pPr algn="ctr" fontAlgn="b"/>
-                      <a:r>
-                        <a:rPr lang="en-IN" sz="1200" u="none" strike="noStrike">
-                          <a:effectLst/>
-                        </a:rPr>
-                        <a:t>0.01</a:t>
-                      </a:r>
-                      <a:endParaRPr lang="en-IN" sz="1200" b="0" i="0" u="none" strike="noStrike">
                         <a:solidFill>
                           <a:srgbClr val="000000"/>
                         </a:solidFill>
@@ -25957,7 +25907,7 @@
                         <a:rPr lang="en-IN" sz="1200" u="none" strike="noStrike" dirty="0">
                           <a:effectLst/>
                         </a:rPr>
-                        <a:t>4.889</a:t>
+                        <a:t>0</a:t>
                       </a:r>
                       <a:endParaRPr lang="en-IN" sz="1200" b="0" i="0" u="none" strike="noStrike" dirty="0">
                         <a:solidFill>
@@ -25975,50 +25925,19 @@
                     <a:bodyPr/>
                     <a:lstStyle/>
                     <a:p>
-                      <a:pPr algn="ctr" fontAlgn="b"/>
+                      <a:pPr marL="0" algn="ctr" defTabSz="914400" rtl="0" eaLnBrk="1" fontAlgn="b" latinLnBrk="0" hangingPunct="1"/>
                       <a:r>
-                        <a:rPr lang="en-IN" sz="1200" u="none" strike="noStrike">
+                        <a:rPr lang="en-IN" sz="1200" u="none" strike="noStrike" kern="1200" dirty="0">
+                          <a:solidFill>
+                            <a:schemeClr val="dk1"/>
+                          </a:solidFill>
                           <a:effectLst/>
+                          <a:latin typeface="+mn-lt"/>
+                          <a:ea typeface="+mn-ea"/>
+                          <a:cs typeface="+mn-cs"/>
                         </a:rPr>
-                        <a:t>Positive</a:t>
+                        <a:t>0.31</a:t>
                       </a:r>
-                      <a:endParaRPr lang="en-IN" sz="1200" b="0" i="0" u="none" strike="noStrike">
-                        <a:solidFill>
-                          <a:srgbClr val="000000"/>
-                        </a:solidFill>
-                        <a:effectLst/>
-                        <a:latin typeface="Aptos Narrow" panose="020B0004020202020204" pitchFamily="34" charset="0"/>
-                      </a:endParaRPr>
-                    </a:p>
-                  </a:txBody>
-                  <a:tcPr marL="9525" marR="9525" marT="9525" marB="0" anchor="b"/>
-                </a:tc>
-                <a:extLst>
-                  <a:ext uri="{0D108BD9-81ED-4DB2-BD59-A6C34878D82A}">
-                    <a16:rowId xmlns:a16="http://schemas.microsoft.com/office/drawing/2014/main" val="513922215"/>
-                  </a:ext>
-                </a:extLst>
-              </a:tr>
-              <a:tr h="230844">
-                <a:tc>
-                  <a:txBody>
-                    <a:bodyPr/>
-                    <a:lstStyle/>
-                    <a:p>
-                      <a:pPr algn="l" fontAlgn="b"/>
-                      <a:r>
-                        <a:rPr lang="en-IN" sz="1200" u="none" strike="noStrike">
-                          <a:effectLst/>
-                        </a:rPr>
-                        <a:t>Tags_Already a student</a:t>
-                      </a:r>
-                      <a:endParaRPr lang="en-IN" sz="1200" b="0" i="0" u="none" strike="noStrike">
-                        <a:solidFill>
-                          <a:srgbClr val="000000"/>
-                        </a:solidFill>
-                        <a:effectLst/>
-                        <a:latin typeface="Calibri Light" panose="020F0302020204030204" pitchFamily="34" charset="0"/>
-                      </a:endParaRPr>
                     </a:p>
                   </a:txBody>
                   <a:tcPr marL="9525" marR="9525" marT="9525" marB="0" anchor="b"/>
@@ -26030,35 +25949,12 @@
                     <a:p>
                       <a:pPr algn="ctr" fontAlgn="b"/>
                       <a:r>
-                        <a:rPr lang="en-IN" sz="1200" u="none" strike="noStrike">
+                        <a:rPr lang="en-IN" sz="1200" u="none" strike="noStrike" dirty="0">
                           <a:effectLst/>
                         </a:rPr>
-                        <a:t>0</a:t>
+                        <a:t>-4.0044</a:t>
                       </a:r>
-                      <a:endParaRPr lang="en-IN" sz="1200" b="0" i="0" u="none" strike="noStrike">
-                        <a:solidFill>
-                          <a:srgbClr val="000000"/>
-                        </a:solidFill>
-                        <a:effectLst/>
-                        <a:latin typeface="Calibri Light" panose="020F0302020204030204" pitchFamily="34" charset="0"/>
-                      </a:endParaRPr>
-                    </a:p>
-                  </a:txBody>
-                  <a:tcPr marL="9525" marR="9525" marT="9525" marB="0" anchor="b"/>
-                </a:tc>
-                <a:tc>
-                  <a:txBody>
-                    <a:bodyPr/>
-                    <a:lstStyle/>
-                    <a:p>
-                      <a:pPr algn="ctr" fontAlgn="b"/>
-                      <a:r>
-                        <a:rPr lang="en-IN" sz="1200" u="none" strike="noStrike">
-                          <a:effectLst/>
-                        </a:rPr>
-                        <a:t>0.31</a:t>
-                      </a:r>
-                      <a:endParaRPr lang="en-IN" sz="1200" b="0" i="0" u="none" strike="noStrike">
+                      <a:endParaRPr lang="en-IN" sz="1200" b="0" i="0" u="none" strike="noStrike" dirty="0">
                         <a:solidFill>
                           <a:srgbClr val="000000"/>
                         </a:solidFill>
@@ -26079,32 +25975,9 @@
                         <a:rPr lang="en-IN" sz="1200" u="none" strike="noStrike" dirty="0">
                           <a:effectLst/>
                         </a:rPr>
-                        <a:t>-4.0012</a:t>
+                        <a:t>Negative</a:t>
                       </a:r>
                       <a:endParaRPr lang="en-IN" sz="1200" b="0" i="0" u="none" strike="noStrike" dirty="0">
-                        <a:solidFill>
-                          <a:srgbClr val="000000"/>
-                        </a:solidFill>
-                        <a:effectLst/>
-                        <a:latin typeface="Calibri Light" panose="020F0302020204030204" pitchFamily="34" charset="0"/>
-                      </a:endParaRPr>
-                    </a:p>
-                  </a:txBody>
-                  <a:tcPr marL="9525" marR="9525" marT="9525" marB="0" anchor="b"/>
-                </a:tc>
-                <a:tc>
-                  <a:txBody>
-                    <a:bodyPr/>
-                    <a:lstStyle/>
-                    <a:p>
-                      <a:pPr algn="ctr" fontAlgn="b"/>
-                      <a:r>
-                        <a:rPr lang="en-IN" sz="1200" u="none" strike="noStrike">
-                          <a:effectLst/>
-                        </a:rPr>
-                        <a:t>Negative</a:t>
-                      </a:r>
-                      <a:endParaRPr lang="en-IN" sz="1200" b="0" i="0" u="none" strike="noStrike">
                         <a:solidFill>
                           <a:srgbClr val="000000"/>
                         </a:solidFill>
@@ -26173,20 +26046,19 @@
                     <a:bodyPr/>
                     <a:lstStyle/>
                     <a:p>
-                      <a:pPr algn="ctr" fontAlgn="b"/>
+                      <a:pPr marL="0" algn="ctr" defTabSz="914400" rtl="0" eaLnBrk="1" fontAlgn="b" latinLnBrk="0" hangingPunct="1"/>
                       <a:r>
-                        <a:rPr lang="en-IN" sz="1200" u="none" strike="noStrike">
+                        <a:rPr lang="en-IN" sz="1200" u="none" strike="noStrike" kern="1200" dirty="0">
+                          <a:solidFill>
+                            <a:schemeClr val="dk1"/>
+                          </a:solidFill>
                           <a:effectLst/>
+                          <a:latin typeface="+mn-lt"/>
+                          <a:ea typeface="+mn-ea"/>
+                          <a:cs typeface="+mn-cs"/>
                         </a:rPr>
                         <a:t>1.02</a:t>
                       </a:r>
-                      <a:endParaRPr lang="en-IN" sz="1200" b="0" i="0" u="none" strike="noStrike">
-                        <a:solidFill>
-                          <a:srgbClr val="000000"/>
-                        </a:solidFill>
-                        <a:effectLst/>
-                        <a:latin typeface="Calibri Light" panose="020F0302020204030204" pitchFamily="34" charset="0"/>
-                      </a:endParaRPr>
                     </a:p>
                   </a:txBody>
                   <a:tcPr marL="9525" marR="9525" marT="9525" marB="0" anchor="b"/>
@@ -26198,12 +26070,12 @@
                     <a:p>
                       <a:pPr algn="ctr" fontAlgn="b"/>
                       <a:r>
-                        <a:rPr lang="en-IN" sz="1200" u="none" strike="noStrike">
+                        <a:rPr lang="en-IN" sz="1200" u="none" strike="noStrike" dirty="0">
                           <a:effectLst/>
                         </a:rPr>
-                        <a:t>-3.9578</a:t>
+                        <a:t>-3.9723</a:t>
                       </a:r>
-                      <a:endParaRPr lang="en-IN" sz="1200" b="0" i="0" u="none" strike="noStrike">
+                      <a:endParaRPr lang="en-IN" sz="1200" b="0" i="0" u="none" strike="noStrike" dirty="0">
                         <a:solidFill>
                           <a:srgbClr val="000000"/>
                         </a:solidFill>
@@ -26251,12 +26123,18 @@
                     <a:p>
                       <a:pPr algn="l" fontAlgn="b"/>
                       <a:r>
-                        <a:rPr lang="en-IN" sz="1200" u="none" strike="noStrike">
+                        <a:rPr lang="en-IN" sz="1200" u="none" strike="noStrike" dirty="0" err="1">
                           <a:effectLst/>
                         </a:rPr>
-                        <a:t>Tags_invalid number</a:t>
+                        <a:t>Tags_invalid</a:t>
                       </a:r>
-                      <a:endParaRPr lang="en-IN" sz="1200" b="0" i="0" u="none" strike="noStrike">
+                      <a:r>
+                        <a:rPr lang="en-IN" sz="1200" u="none" strike="noStrike" dirty="0">
+                          <a:effectLst/>
+                        </a:rPr>
+                        <a:t> number</a:t>
+                      </a:r>
+                      <a:endParaRPr lang="en-IN" sz="1200" b="0" i="0" u="none" strike="noStrike" dirty="0">
                         <a:solidFill>
                           <a:srgbClr val="000000"/>
                         </a:solidFill>
@@ -26274,12 +26152,12 @@
                     <a:p>
                       <a:pPr algn="ctr" fontAlgn="b"/>
                       <a:r>
-                        <a:rPr lang="en-IN" sz="1200" u="none" strike="noStrike">
+                        <a:rPr lang="en-IN" sz="1200" u="none" strike="noStrike" dirty="0">
                           <a:effectLst/>
                         </a:rPr>
                         <a:t>0</a:t>
                       </a:r>
-                      <a:endParaRPr lang="en-IN" sz="1200" b="0" i="0" u="none" strike="noStrike">
+                      <a:endParaRPr lang="en-IN" sz="1200" b="0" i="0" u="none" strike="noStrike" dirty="0">
                         <a:solidFill>
                           <a:srgbClr val="000000"/>
                         </a:solidFill>
@@ -26295,20 +26173,19 @@
                     <a:bodyPr/>
                     <a:lstStyle/>
                     <a:p>
-                      <a:pPr algn="ctr" fontAlgn="b"/>
+                      <a:pPr marL="0" algn="ctr" defTabSz="914400" rtl="0" eaLnBrk="1" fontAlgn="b" latinLnBrk="0" hangingPunct="1"/>
                       <a:r>
-                        <a:rPr lang="en-IN" sz="1200" u="none" strike="noStrike">
+                        <a:rPr lang="en-IN" sz="1200" u="none" strike="noStrike" kern="1200" dirty="0">
+                          <a:solidFill>
+                            <a:schemeClr val="dk1"/>
+                          </a:solidFill>
                           <a:effectLst/>
+                          <a:latin typeface="+mn-lt"/>
+                          <a:ea typeface="+mn-ea"/>
+                          <a:cs typeface="+mn-cs"/>
                         </a:rPr>
                         <a:t>1.01</a:t>
                       </a:r>
-                      <a:endParaRPr lang="en-IN" sz="1200" b="0" i="0" u="none" strike="noStrike">
-                        <a:solidFill>
-                          <a:srgbClr val="000000"/>
-                        </a:solidFill>
-                        <a:effectLst/>
-                        <a:latin typeface="Calibri Light" panose="020F0302020204030204" pitchFamily="34" charset="0"/>
-                      </a:endParaRPr>
                     </a:p>
                   </a:txBody>
                   <a:tcPr marL="9525" marR="9525" marT="9525" marB="0" anchor="b"/>
@@ -26320,12 +26197,12 @@
                     <a:p>
                       <a:pPr algn="ctr" fontAlgn="b"/>
                       <a:r>
-                        <a:rPr lang="en-IN" sz="1200" u="none" strike="noStrike">
+                        <a:rPr lang="en-IN" sz="1200" u="none" strike="noStrike" dirty="0">
                           <a:effectLst/>
                         </a:rPr>
-                        <a:t>-3.8987</a:t>
+                        <a:t>-3.9129</a:t>
                       </a:r>
-                      <a:endParaRPr lang="en-IN" sz="1200" b="0" i="0" u="none" strike="noStrike">
+                      <a:endParaRPr lang="en-IN" sz="1200" b="0" i="0" u="none" strike="noStrike" dirty="0">
                         <a:solidFill>
                           <a:srgbClr val="000000"/>
                         </a:solidFill>
@@ -26373,12 +26250,24 @@
                     <a:p>
                       <a:pPr algn="l" fontAlgn="b"/>
                       <a:r>
-                        <a:rPr lang="en-IN" sz="1200" u="none" strike="noStrike">
+                        <a:rPr lang="en-IN" sz="1200" u="none" strike="noStrike" dirty="0">
                           <a:effectLst/>
                         </a:rPr>
-                        <a:t>Lead Source_Welingak Website</a:t>
+                        <a:t>Lead </a:t>
                       </a:r>
-                      <a:endParaRPr lang="en-IN" sz="1200" b="0" i="0" u="none" strike="noStrike">
+                      <a:r>
+                        <a:rPr lang="en-IN" sz="1200" u="none" strike="noStrike" dirty="0" err="1">
+                          <a:effectLst/>
+                        </a:rPr>
+                        <a:t>Source_Welingak</a:t>
+                      </a:r>
+                      <a:r>
+                        <a:rPr lang="en-IN" sz="1200" u="none" strike="noStrike" dirty="0">
+                          <a:effectLst/>
+                        </a:rPr>
+                        <a:t> Website</a:t>
+                      </a:r>
+                      <a:endParaRPr lang="en-IN" sz="1200" b="0" i="0" u="none" strike="noStrike" dirty="0">
                         <a:solidFill>
                           <a:srgbClr val="000000"/>
                         </a:solidFill>
@@ -26396,12 +26285,57 @@
                     <a:p>
                       <a:pPr algn="ctr" fontAlgn="b"/>
                       <a:r>
-                        <a:rPr lang="en-IN" sz="1200" u="none" strike="noStrike">
+                        <a:rPr lang="en-IN" sz="1200" u="none" strike="noStrike" dirty="0">
                           <a:effectLst/>
                         </a:rPr>
-                        <a:t>0.023</a:t>
+                        <a:t>0</a:t>
                       </a:r>
-                      <a:endParaRPr lang="en-IN" sz="1200" b="0" i="0" u="none" strike="noStrike">
+                      <a:endParaRPr lang="en-IN" sz="1200" b="0" i="0" u="none" strike="noStrike" dirty="0">
+                        <a:solidFill>
+                          <a:srgbClr val="000000"/>
+                        </a:solidFill>
+                        <a:effectLst/>
+                        <a:latin typeface="Calibri Light" panose="020F0302020204030204" pitchFamily="34" charset="0"/>
+                      </a:endParaRPr>
+                    </a:p>
+                  </a:txBody>
+                  <a:tcPr marL="9525" marR="9525" marT="9525" marB="0" anchor="b"/>
+                </a:tc>
+                <a:tc>
+                  <a:txBody>
+                    <a:bodyPr/>
+                    <a:lstStyle/>
+                    <a:p>
+                      <a:pPr marL="0" algn="ctr" defTabSz="914400" rtl="0" eaLnBrk="1" fontAlgn="b" latinLnBrk="0" hangingPunct="1"/>
+                      <a:r>
+                        <a:rPr lang="en-IN" sz="1200" u="none" strike="noStrike" kern="1200" dirty="0">
+                          <a:solidFill>
+                            <a:schemeClr val="dk1"/>
+                          </a:solidFill>
+                          <a:effectLst/>
+                          <a:latin typeface="+mn-lt"/>
+                          <a:ea typeface="+mn-ea"/>
+                          <a:cs typeface="+mn-cs"/>
+                        </a:rPr>
+                        <a:t>1.03</a:t>
+                      </a:r>
+                    </a:p>
+                  </a:txBody>
+                  <a:tcPr marL="9525" marR="9525" marT="9525" marB="0" anchor="b"/>
+                </a:tc>
+                <a:tc>
+                  <a:txBody>
+                    <a:bodyPr/>
+                    <a:lstStyle/>
+                    <a:p>
+                      <a:pPr algn="ctr" fontAlgn="b"/>
+                      <a:r>
+                        <a:rPr lang="en-IN" sz="1200" u="none" strike="noStrike" dirty="0">
+                          <a:effectLst/>
+                        </a:rPr>
+                        <a:t>4.4460</a:t>
+                      </a:r>
+                      <a:endParaRPr lang="en-IN" sz="1200" b="0" i="0" u="none" strike="noStrike" dirty="0">
                         <a:solidFill>
                           <a:srgbClr val="000000"/>
                         </a:solidFill>
@@ -26419,58 +26353,12 @@
                     <a:p>
                       <a:pPr algn="ctr" fontAlgn="b"/>
                       <a:r>
-                        <a:rPr lang="en-IN" sz="1200" u="none" strike="noStrike">
-                          <a:effectLst/>
-                        </a:rPr>
-                        <a:t>1.31</a:t>
-                      </a:r>
-                      <a:endParaRPr lang="en-IN" sz="1200" b="0" i="0" u="none" strike="noStrike">
-                        <a:solidFill>
-                          <a:srgbClr val="000000"/>
-                        </a:solidFill>
-                        <a:effectLst/>
-                        <a:latin typeface="Calibri Light" panose="020F0302020204030204" pitchFamily="34" charset="0"/>
-                      </a:endParaRPr>
-                    </a:p>
-                  </a:txBody>
-                  <a:tcPr marL="9525" marR="9525" marT="9525" marB="0" anchor="b"/>
-                </a:tc>
-                <a:tc>
-                  <a:txBody>
-                    <a:bodyPr/>
-                    <a:lstStyle/>
-                    <a:p>
-                      <a:pPr algn="ctr" fontAlgn="b"/>
-                      <a:r>
-                        <a:rPr lang="en-IN" sz="1200" u="none" strike="noStrike">
-                          <a:effectLst/>
-                        </a:rPr>
-                        <a:t>3.5596</a:t>
-                      </a:r>
-                      <a:endParaRPr lang="en-IN" sz="1200" b="0" i="0" u="none" strike="noStrike">
-                        <a:solidFill>
-                          <a:srgbClr val="000000"/>
-                        </a:solidFill>
-                        <a:effectLst/>
-                        <a:latin typeface="Calibri Light" panose="020F0302020204030204" pitchFamily="34" charset="0"/>
-                      </a:endParaRPr>
-                    </a:p>
-                  </a:txBody>
-                  <a:tcPr marL="9525" marR="9525" marT="9525" marB="0" anchor="b"/>
-                </a:tc>
-                <a:tc>
-                  <a:txBody>
-                    <a:bodyPr/>
-                    <a:lstStyle/>
-                    <a:p>
-                      <a:pPr algn="ctr" fontAlgn="b"/>
-                      <a:r>
-                        <a:rPr lang="en-IN" sz="1200" u="none" strike="noStrike">
+                        <a:rPr lang="en-IN" sz="1200" u="none" strike="noStrike" dirty="0">
                           <a:effectLst/>
                         </a:rPr>
                         <a:t>Positive</a:t>
                       </a:r>
-                      <a:endParaRPr lang="en-IN" sz="1200" b="0" i="0" u="none" strike="noStrike">
+                      <a:endParaRPr lang="en-IN" sz="1200" b="0" i="0" u="none" strike="noStrike" dirty="0">
                         <a:solidFill>
                           <a:srgbClr val="000000"/>
                         </a:solidFill>
@@ -26518,12 +26406,12 @@
                     <a:p>
                       <a:pPr algn="ctr" fontAlgn="b"/>
                       <a:r>
-                        <a:rPr lang="en-IN" sz="1200" u="none" strike="noStrike">
+                        <a:rPr lang="en-IN" sz="1200" u="none" strike="noStrike" dirty="0">
                           <a:effectLst/>
                         </a:rPr>
                         <a:t>0</a:t>
                       </a:r>
-                      <a:endParaRPr lang="en-IN" sz="1200" b="0" i="0" u="none" strike="noStrike">
+                      <a:endParaRPr lang="en-IN" sz="1200" b="0" i="0" u="none" strike="noStrike" dirty="0">
                         <a:solidFill>
                           <a:srgbClr val="000000"/>
                         </a:solidFill>
@@ -26539,20 +26427,19 @@
                     <a:bodyPr/>
                     <a:lstStyle/>
                     <a:p>
-                      <a:pPr algn="ctr" fontAlgn="b"/>
+                      <a:pPr marL="0" algn="ctr" defTabSz="914400" rtl="0" eaLnBrk="1" fontAlgn="b" latinLnBrk="0" hangingPunct="1"/>
                       <a:r>
-                        <a:rPr lang="en-IN" sz="1200" u="none" strike="noStrike">
+                        <a:rPr lang="en-IN" sz="1200" u="none" strike="noStrike" kern="1200" dirty="0">
+                          <a:solidFill>
+                            <a:schemeClr val="dk1"/>
+                          </a:solidFill>
                           <a:effectLst/>
+                          <a:latin typeface="+mn-lt"/>
+                          <a:ea typeface="+mn-ea"/>
+                          <a:cs typeface="+mn-cs"/>
                         </a:rPr>
                         <a:t>0.18</a:t>
                       </a:r>
-                      <a:endParaRPr lang="en-IN" sz="1200" b="0" i="0" u="none" strike="noStrike">
-                        <a:solidFill>
-                          <a:srgbClr val="000000"/>
-                        </a:solidFill>
-                        <a:effectLst/>
-                        <a:latin typeface="Calibri Light" panose="020F0302020204030204" pitchFamily="34" charset="0"/>
-                      </a:endParaRPr>
                     </a:p>
                   </a:txBody>
                   <a:tcPr marL="9525" marR="9525" marT="9525" marB="0" anchor="b"/>
@@ -26564,12 +26451,12 @@
                     <a:p>
                       <a:pPr algn="ctr" fontAlgn="b"/>
                       <a:r>
-                        <a:rPr lang="en-IN" sz="1200" u="none" strike="noStrike">
+                        <a:rPr lang="en-IN" sz="1200" u="none" strike="noStrike" dirty="0">
                           <a:effectLst/>
                         </a:rPr>
-                        <a:t>-3.1902</a:t>
+                        <a:t>-3.1518</a:t>
                       </a:r>
-                      <a:endParaRPr lang="en-IN" sz="1200" b="0" i="0" u="none" strike="noStrike">
+                      <a:endParaRPr lang="en-IN" sz="1200" b="0" i="0" u="none" strike="noStrike" dirty="0">
                         <a:solidFill>
                           <a:srgbClr val="000000"/>
                         </a:solidFill>
@@ -26640,12 +26527,12 @@
                     <a:p>
                       <a:pPr algn="ctr" fontAlgn="b"/>
                       <a:r>
-                        <a:rPr lang="en-IN" sz="1200" u="none" strike="noStrike">
+                        <a:rPr lang="en-IN" sz="1200" u="none" strike="noStrike" dirty="0">
                           <a:effectLst/>
                         </a:rPr>
                         <a:t>0.007</a:t>
                       </a:r>
-                      <a:endParaRPr lang="en-IN" sz="1200" b="0" i="0" u="none" strike="noStrike">
+                      <a:endParaRPr lang="en-IN" sz="1200" b="0" i="0" u="none" strike="noStrike" dirty="0">
                         <a:solidFill>
                           <a:srgbClr val="000000"/>
                         </a:solidFill>
@@ -26661,20 +26548,19 @@
                     <a:bodyPr/>
                     <a:lstStyle/>
                     <a:p>
-                      <a:pPr algn="ctr" fontAlgn="b"/>
+                      <a:pPr marL="0" algn="ctr" defTabSz="914400" rtl="0" eaLnBrk="1" fontAlgn="b" latinLnBrk="0" hangingPunct="1"/>
                       <a:r>
-                        <a:rPr lang="en-IN" sz="1200" u="none" strike="noStrike">
+                        <a:rPr lang="en-IN" sz="1200" u="none" strike="noStrike" kern="1200" dirty="0">
+                          <a:solidFill>
+                            <a:schemeClr val="dk1"/>
+                          </a:solidFill>
                           <a:effectLst/>
+                          <a:latin typeface="+mn-lt"/>
+                          <a:ea typeface="+mn-ea"/>
+                          <a:cs typeface="+mn-cs"/>
                         </a:rPr>
                         <a:t>1.03</a:t>
                       </a:r>
-                      <a:endParaRPr lang="en-IN" sz="1200" b="0" i="0" u="none" strike="noStrike">
-                        <a:solidFill>
-                          <a:srgbClr val="000000"/>
-                        </a:solidFill>
-                        <a:effectLst/>
-                        <a:latin typeface="Calibri Light" panose="020F0302020204030204" pitchFamily="34" charset="0"/>
-                      </a:endParaRPr>
                     </a:p>
                   </a:txBody>
                   <a:tcPr marL="9525" marR="9525" marT="9525" marB="0" anchor="b"/>
@@ -26686,12 +26572,12 @@
                     <a:p>
                       <a:pPr algn="ctr" fontAlgn="b"/>
                       <a:r>
-                        <a:rPr lang="en-IN" sz="1200" u="none" strike="noStrike">
+                        <a:rPr lang="en-IN" sz="1200" u="none" strike="noStrike" dirty="0">
                           <a:effectLst/>
                         </a:rPr>
-                        <a:t>-2.7734</a:t>
+                        <a:t>-2.7571</a:t>
                       </a:r>
-                      <a:endParaRPr lang="en-IN" sz="1200" b="0" i="0" u="none" strike="noStrike">
+                      <a:endParaRPr lang="en-IN" sz="1200" b="0" i="0" u="none" strike="noStrike" dirty="0">
                         <a:solidFill>
                           <a:srgbClr val="000000"/>
                         </a:solidFill>
@@ -26762,12 +26648,12 @@
                     <a:p>
                       <a:pPr algn="ctr" fontAlgn="b"/>
                       <a:r>
-                        <a:rPr lang="en-IN" sz="1200" u="none" strike="noStrike">
+                        <a:rPr lang="en-IN" sz="1200" u="none" strike="noStrike" dirty="0">
                           <a:effectLst/>
                         </a:rPr>
                         <a:t>0</a:t>
                       </a:r>
-                      <a:endParaRPr lang="en-IN" sz="1200" b="0" i="0" u="none" strike="noStrike">
+                      <a:endParaRPr lang="en-IN" sz="1200" b="0" i="0" u="none" strike="noStrike" dirty="0">
                         <a:solidFill>
                           <a:srgbClr val="000000"/>
                         </a:solidFill>
@@ -26783,20 +26669,19 @@
                     <a:bodyPr/>
                     <a:lstStyle/>
                     <a:p>
-                      <a:pPr algn="ctr" fontAlgn="b"/>
+                      <a:pPr marL="0" algn="ctr" defTabSz="914400" rtl="0" eaLnBrk="1" fontAlgn="b" latinLnBrk="0" hangingPunct="1"/>
                       <a:r>
-                        <a:rPr lang="en-IN" sz="1200" u="none" strike="noStrike">
+                        <a:rPr lang="en-IN" sz="1200" u="none" strike="noStrike" kern="1200" dirty="0">
+                          <a:solidFill>
+                            <a:schemeClr val="dk1"/>
+                          </a:solidFill>
                           <a:effectLst/>
+                          <a:latin typeface="+mn-lt"/>
+                          <a:ea typeface="+mn-ea"/>
+                          <a:cs typeface="+mn-cs"/>
                         </a:rPr>
                         <a:t>0.06</a:t>
                       </a:r>
-                      <a:endParaRPr lang="en-IN" sz="1200" b="0" i="0" u="none" strike="noStrike">
-                        <a:solidFill>
-                          <a:srgbClr val="000000"/>
-                        </a:solidFill>
-                        <a:effectLst/>
-                        <a:latin typeface="Calibri Light" panose="020F0302020204030204" pitchFamily="34" charset="0"/>
-                      </a:endParaRPr>
                     </a:p>
                   </a:txBody>
                   <a:tcPr marL="9525" marR="9525" marT="9525" marB="0" anchor="b"/>
@@ -26808,12 +26693,12 @@
                     <a:p>
                       <a:pPr algn="ctr" fontAlgn="b"/>
                       <a:r>
-                        <a:rPr lang="en-IN" sz="1200" u="none" strike="noStrike">
+                        <a:rPr lang="en-IN" sz="1200" u="none" strike="noStrike" dirty="0">
                           <a:effectLst/>
                         </a:rPr>
-                        <a:t>2.1749</a:t>
+                        <a:t>2.1861</a:t>
                       </a:r>
-                      <a:endParaRPr lang="en-IN" sz="1200" b="0" i="0" u="none" strike="noStrike">
+                      <a:endParaRPr lang="en-IN" sz="1200" b="0" i="0" u="none" strike="noStrike" dirty="0">
                         <a:solidFill>
                           <a:srgbClr val="000000"/>
                         </a:solidFill>
@@ -26861,12 +26746,18 @@
                     <a:p>
                       <a:pPr algn="l" fontAlgn="b"/>
                       <a:r>
-                        <a:rPr lang="en-IN" sz="1200" u="none" strike="noStrike">
+                        <a:rPr lang="en-IN" sz="1200" u="none" strike="noStrike" dirty="0" err="1">
                           <a:effectLst/>
                         </a:rPr>
-                        <a:t>Tags_Interested in other courses</a:t>
+                        <a:t>Tags_Interested</a:t>
                       </a:r>
-                      <a:endParaRPr lang="en-IN" sz="1200" b="0" i="0" u="none" strike="noStrike">
+                      <a:r>
+                        <a:rPr lang="en-IN" sz="1200" u="none" strike="noStrike" dirty="0">
+                          <a:effectLst/>
+                        </a:rPr>
+                        <a:t> in other courses</a:t>
+                      </a:r>
+                      <a:endParaRPr lang="en-IN" sz="1200" b="0" i="0" u="none" strike="noStrike" dirty="0">
                         <a:solidFill>
                           <a:srgbClr val="000000"/>
                         </a:solidFill>
@@ -26884,12 +26775,12 @@
                     <a:p>
                       <a:pPr algn="ctr" fontAlgn="b"/>
                       <a:r>
-                        <a:rPr lang="en-IN" sz="1200" u="none" strike="noStrike">
+                        <a:rPr lang="en-IN" sz="1200" u="none" strike="noStrike" dirty="0">
                           <a:effectLst/>
                         </a:rPr>
                         <a:t>0</a:t>
                       </a:r>
-                      <a:endParaRPr lang="en-IN" sz="1200" b="0" i="0" u="none" strike="noStrike">
+                      <a:endParaRPr lang="en-IN" sz="1200" b="0" i="0" u="none" strike="noStrike" dirty="0">
                         <a:solidFill>
                           <a:srgbClr val="000000"/>
                         </a:solidFill>
@@ -26905,20 +26796,19 @@
                     <a:bodyPr/>
                     <a:lstStyle/>
                     <a:p>
-                      <a:pPr algn="ctr" fontAlgn="b"/>
+                      <a:pPr marL="0" algn="ctr" defTabSz="914400" rtl="0" eaLnBrk="1" fontAlgn="b" latinLnBrk="0" hangingPunct="1"/>
                       <a:r>
-                        <a:rPr lang="en-IN" sz="1200" u="none" strike="noStrike">
+                        <a:rPr lang="en-IN" sz="1200" u="none" strike="noStrike" kern="1200" dirty="0">
+                          <a:solidFill>
+                            <a:schemeClr val="dk1"/>
+                          </a:solidFill>
                           <a:effectLst/>
+                          <a:latin typeface="+mn-lt"/>
+                          <a:ea typeface="+mn-ea"/>
+                          <a:cs typeface="+mn-cs"/>
                         </a:rPr>
                         <a:t>0.42</a:t>
                       </a:r>
-                      <a:endParaRPr lang="en-IN" sz="1200" b="0" i="0" u="none" strike="noStrike">
-                        <a:solidFill>
-                          <a:srgbClr val="000000"/>
-                        </a:solidFill>
-                        <a:effectLst/>
-                        <a:latin typeface="Calibri Light" panose="020F0302020204030204" pitchFamily="34" charset="0"/>
-                      </a:endParaRPr>
                     </a:p>
                   </a:txBody>
                   <a:tcPr marL="9525" marR="9525" marT="9525" marB="0" anchor="b"/>
@@ -26930,12 +26820,12 @@
                     <a:p>
                       <a:pPr algn="ctr" fontAlgn="b"/>
                       <a:r>
-                        <a:rPr lang="en-IN" sz="1200" u="none" strike="noStrike">
+                        <a:rPr lang="en-IN" sz="1200" u="none" strike="noStrike" dirty="0">
                           <a:effectLst/>
                         </a:rPr>
-                        <a:t>-1.7412</a:t>
+                        <a:t>-1.7319</a:t>
                       </a:r>
-                      <a:endParaRPr lang="en-IN" sz="1200" b="0" i="0" u="none" strike="noStrike">
+                      <a:endParaRPr lang="en-IN" sz="1200" b="0" i="0" u="none" strike="noStrike" dirty="0">
                         <a:solidFill>
                           <a:srgbClr val="000000"/>
                         </a:solidFill>
@@ -26983,12 +26873,18 @@
                     <a:p>
                       <a:pPr algn="l" fontAlgn="b"/>
                       <a:r>
-                        <a:rPr lang="en-IN" sz="1200" u="none" strike="noStrike">
+                        <a:rPr lang="en-IN" sz="1200" u="none" strike="noStrike" dirty="0">
                           <a:effectLst/>
                         </a:rPr>
-                        <a:t>Tags_Interested in full time MBA</a:t>
+                        <a:t>Last Notable </a:t>
                       </a:r>
-                      <a:endParaRPr lang="en-IN" sz="1200" b="0" i="0" u="none" strike="noStrike">
+                      <a:r>
+                        <a:rPr lang="en-IN" sz="1200" u="none" strike="noStrike" dirty="0" err="1">
+                          <a:effectLst/>
+                        </a:rPr>
+                        <a:t>Activity_Modified</a:t>
+                      </a:r>
+                      <a:endParaRPr lang="en-IN" sz="1200" b="0" i="0" u="none" strike="noStrike" dirty="0">
                         <a:solidFill>
                           <a:srgbClr val="000000"/>
                         </a:solidFill>
@@ -27009,7 +26905,7 @@
                         <a:rPr lang="en-IN" sz="1200" u="none" strike="noStrike">
                           <a:effectLst/>
                         </a:rPr>
-                        <a:t>0.017</a:t>
+                        <a:t>0</a:t>
                       </a:r>
                       <a:endParaRPr lang="en-IN" sz="1200" b="0" i="0" u="none" strike="noStrike">
                         <a:solidFill>
@@ -27027,14 +26923,94 @@
                     <a:bodyPr/>
                     <a:lstStyle/>
                     <a:p>
+                      <a:pPr marL="0" algn="ctr" defTabSz="914400" rtl="0" eaLnBrk="1" fontAlgn="b" latinLnBrk="0" hangingPunct="1"/>
+                      <a:r>
+                        <a:rPr lang="en-IN" sz="1200" u="none" strike="noStrike" kern="1200" dirty="0">
+                          <a:solidFill>
+                            <a:schemeClr val="dk1"/>
+                          </a:solidFill>
+                          <a:effectLst/>
+                          <a:latin typeface="+mn-lt"/>
+                          <a:ea typeface="+mn-ea"/>
+                          <a:cs typeface="+mn-cs"/>
+                        </a:rPr>
+                        <a:t>0.01</a:t>
+                      </a:r>
+                    </a:p>
+                  </a:txBody>
+                  <a:tcPr marL="9525" marR="9525" marT="9525" marB="0" anchor="b"/>
+                </a:tc>
+                <a:tc>
+                  <a:txBody>
+                    <a:bodyPr/>
+                    <a:lstStyle/>
+                    <a:p>
+                      <a:pPr marL="0" algn="ctr" defTabSz="914400" rtl="0" eaLnBrk="1" fontAlgn="b" latinLnBrk="0" hangingPunct="1"/>
+                      <a:r>
+                        <a:rPr lang="en-IN" sz="1200" u="none" strike="noStrike" kern="1200" dirty="0">
+                          <a:solidFill>
+                            <a:schemeClr val="dk1"/>
+                          </a:solidFill>
+                          <a:effectLst/>
+                          <a:latin typeface="+mn-lt"/>
+                          <a:ea typeface="+mn-ea"/>
+                          <a:cs typeface="+mn-cs"/>
+                        </a:rPr>
+                        <a:t>-1.6720</a:t>
+                      </a:r>
+                    </a:p>
+                  </a:txBody>
+                  <a:tcPr marL="9525" marR="9525" marT="9525" marB="0" anchor="b"/>
+                </a:tc>
+                <a:tc>
+                  <a:txBody>
+                    <a:bodyPr/>
+                    <a:lstStyle/>
+                    <a:p>
                       <a:pPr algn="ctr" fontAlgn="b"/>
                       <a:r>
-                        <a:rPr lang="en-IN" sz="1200" u="none" strike="noStrike">
+                        <a:rPr lang="en-IN" sz="1200" u="none" strike="noStrike" dirty="0">
                           <a:effectLst/>
                         </a:rPr>
-                        <a:t>1.02</a:t>
+                        <a:t>Negative</a:t>
                       </a:r>
-                      <a:endParaRPr lang="en-IN" sz="1200" b="0" i="0" u="none" strike="noStrike">
+                      <a:endParaRPr lang="en-IN" sz="1200" b="0" i="0" u="none" strike="noStrike" dirty="0">
+                        <a:solidFill>
+                          <a:srgbClr val="000000"/>
+                        </a:solidFill>
+                        <a:effectLst/>
+                        <a:latin typeface="Aptos Narrow" panose="020B0004020202020204" pitchFamily="34" charset="0"/>
+                      </a:endParaRPr>
+                    </a:p>
+                  </a:txBody>
+                  <a:tcPr marL="9525" marR="9525" marT="9525" marB="0" anchor="b"/>
+                </a:tc>
+                <a:extLst>
+                  <a:ext uri="{0D108BD9-81ED-4DB2-BD59-A6C34878D82A}">
+                    <a16:rowId xmlns:a16="http://schemas.microsoft.com/office/drawing/2014/main" val="3032982995"/>
+                  </a:ext>
+                </a:extLst>
+              </a:tr>
+              <a:tr h="230844">
+                <a:tc>
+                  <a:txBody>
+                    <a:bodyPr/>
+                    <a:lstStyle/>
+                    <a:p>
+                      <a:pPr algn="l" fontAlgn="b"/>
+                      <a:r>
+                        <a:rPr lang="en-IN" sz="1200" u="none" strike="noStrike" dirty="0" err="1">
+                          <a:effectLst/>
+                        </a:rPr>
+                        <a:t>Tags_Interested</a:t>
+                      </a:r>
+                      <a:r>
+                        <a:rPr lang="en-IN" sz="1200" u="none" strike="noStrike" dirty="0">
+                          <a:effectLst/>
+                        </a:rPr>
+                        <a:t> in full time MBA</a:t>
+                      </a:r>
+                      <a:endParaRPr lang="en-IN" sz="1200" b="0" i="0" u="none" strike="noStrike" dirty="0">
                         <a:solidFill>
                           <a:srgbClr val="000000"/>
                         </a:solidFill>
@@ -27052,12 +27028,57 @@
                     <a:p>
                       <a:pPr algn="ctr" fontAlgn="b"/>
                       <a:r>
-                        <a:rPr lang="en-IN" sz="1200" u="none" strike="noStrike">
+                        <a:rPr lang="en-IN" sz="1200" u="none" strike="noStrike" dirty="0">
                           <a:effectLst/>
                         </a:rPr>
-                        <a:t>-1.4207</a:t>
+                        <a:t>0.017</a:t>
                       </a:r>
-                      <a:endParaRPr lang="en-IN" sz="1200" b="0" i="0" u="none" strike="noStrike">
+                      <a:endParaRPr lang="en-IN" sz="1200" b="0" i="0" u="none" strike="noStrike" dirty="0">
+                        <a:solidFill>
+                          <a:srgbClr val="000000"/>
+                        </a:solidFill>
+                        <a:effectLst/>
+                        <a:latin typeface="Calibri Light" panose="020F0302020204030204" pitchFamily="34" charset="0"/>
+                      </a:endParaRPr>
+                    </a:p>
+                  </a:txBody>
+                  <a:tcPr marL="9525" marR="9525" marT="9525" marB="0" anchor="b"/>
+                </a:tc>
+                <a:tc>
+                  <a:txBody>
+                    <a:bodyPr/>
+                    <a:lstStyle/>
+                    <a:p>
+                      <a:pPr marL="0" algn="ctr" defTabSz="914400" rtl="0" eaLnBrk="1" fontAlgn="b" latinLnBrk="0" hangingPunct="1"/>
+                      <a:r>
+                        <a:rPr lang="en-IN" sz="1200" u="none" strike="noStrike" kern="1200" dirty="0">
+                          <a:solidFill>
+                            <a:schemeClr val="dk1"/>
+                          </a:solidFill>
+                          <a:effectLst/>
+                          <a:latin typeface="+mn-lt"/>
+                          <a:ea typeface="+mn-ea"/>
+                          <a:cs typeface="+mn-cs"/>
+                        </a:rPr>
+                        <a:t>1.02</a:t>
+                      </a:r>
+                    </a:p>
+                  </a:txBody>
+                  <a:tcPr marL="9525" marR="9525" marT="9525" marB="0" anchor="b"/>
+                </a:tc>
+                <a:tc>
+                  <a:txBody>
+                    <a:bodyPr/>
+                    <a:lstStyle/>
+                    <a:p>
+                      <a:pPr algn="ctr" fontAlgn="b"/>
+                      <a:r>
+                        <a:rPr lang="en-IN" sz="1200" u="none" strike="noStrike" dirty="0">
+                          <a:effectLst/>
+                        </a:rPr>
+                        <a:t>-1.4234</a:t>
+                      </a:r>
+                      <a:endParaRPr lang="en-IN" sz="1200" b="0" i="0" u="none" strike="noStrike" dirty="0">
                         <a:solidFill>
                           <a:srgbClr val="000000"/>
                         </a:solidFill>
@@ -27075,12 +27096,12 @@
                     <a:p>
                       <a:pPr algn="ctr" fontAlgn="b"/>
                       <a:r>
-                        <a:rPr lang="en-IN" sz="1200" u="none" strike="noStrike">
+                        <a:rPr lang="en-IN" sz="1200" u="none" strike="noStrike" dirty="0">
                           <a:effectLst/>
                         </a:rPr>
                         <a:t>Negative</a:t>
                       </a:r>
-                      <a:endParaRPr lang="en-IN" sz="1200" b="0" i="0" u="none" strike="noStrike">
+                      <a:endParaRPr lang="en-IN" sz="1200" b="0" i="0" u="none" strike="noStrike" dirty="0">
                         <a:solidFill>
                           <a:srgbClr val="000000"/>
                         </a:solidFill>
@@ -27149,20 +27170,19 @@
                     <a:bodyPr/>
                     <a:lstStyle/>
                     <a:p>
-                      <a:pPr algn="ctr" fontAlgn="b"/>
+                      <a:pPr marL="0" algn="ctr" defTabSz="914400" rtl="0" eaLnBrk="1" fontAlgn="b" latinLnBrk="0" hangingPunct="1"/>
                       <a:r>
-                        <a:rPr lang="en-IN" sz="1200" u="none" strike="noStrike">
+                        <a:rPr lang="en-IN" sz="1200" u="none" strike="noStrike" kern="1200" dirty="0">
+                          <a:solidFill>
+                            <a:schemeClr val="dk1"/>
+                          </a:solidFill>
                           <a:effectLst/>
+                          <a:latin typeface="+mn-lt"/>
+                          <a:ea typeface="+mn-ea"/>
+                          <a:cs typeface="+mn-cs"/>
                         </a:rPr>
                         <a:t>0.75</a:t>
                       </a:r>
-                      <a:endParaRPr lang="en-IN" sz="1200" b="0" i="0" u="none" strike="noStrike">
-                        <a:solidFill>
-                          <a:srgbClr val="000000"/>
-                        </a:solidFill>
-                        <a:effectLst/>
-                        <a:latin typeface="Calibri Light" panose="020F0302020204030204" pitchFamily="34" charset="0"/>
-                      </a:endParaRPr>
                     </a:p>
                   </a:txBody>
                   <a:tcPr marL="9525" marR="9525" marT="9525" marB="0" anchor="b"/>
@@ -29107,8 +29127,8 @@
         </p:nvSpPr>
         <p:spPr>
           <a:xfrm>
-            <a:off x="1974710" y="903838"/>
-            <a:ext cx="2326640" cy="307777"/>
+            <a:off x="1251305" y="892744"/>
+            <a:ext cx="3773450" cy="307777"/>
           </a:xfrm>
           <a:prstGeom prst="rect">
             <a:avLst/>
@@ -29124,7 +29144,7 @@
             <a:pPr algn="ctr"/>
             <a:r>
               <a:rPr lang="en-US" sz="1400" dirty="0"/>
-              <a:t>CONFUSION MATRIX</a:t>
+              <a:t>ACCURACY, SENSITIVITY, SPECIFICITY ANALYSIS</a:t>
             </a:r>
           </a:p>
         </p:txBody>
@@ -30809,7 +30829,7 @@
             </a:pPr>
             <a:r>
               <a:rPr lang="en-IN" sz="1800" dirty="0"/>
-              <a:t>Last Notable Activity with Modified values has a good positive impact towards conversions</a:t>
+              <a:t>Last Notable Activity with Modified values has a negative impact towards conversions.</a:t>
             </a:r>
           </a:p>
           <a:p>
@@ -30953,10 +30973,7 @@
             <a:avLst/>
           </a:prstGeom>
           <a:solidFill>
-            <a:schemeClr val="accent5">
-              <a:lumMod val="60000"/>
-              <a:lumOff val="40000"/>
-            </a:schemeClr>
+            <a:srgbClr val="FFC000"/>
           </a:solidFill>
         </p:spPr>
         <p:style>
@@ -30981,7 +30998,11 @@
           <a:p>
             <a:pPr algn="ctr"/>
             <a:r>
-              <a:rPr lang="en-US" sz="1400" dirty="0"/>
+              <a:rPr lang="en-US" sz="1400" dirty="0">
+                <a:solidFill>
+                  <a:schemeClr val="tx1"/>
+                </a:solidFill>
+              </a:rPr>
               <a:t>Last Notable Activity</a:t>
             </a:r>
           </a:p>
@@ -31726,7 +31747,7 @@
             <a:avLst/>
           </a:prstGeom>
           <a:solidFill>
-            <a:schemeClr val="accent5"/>
+            <a:srgbClr val="FFC000"/>
           </a:solidFill>
         </p:spPr>
         <p:style>
@@ -31751,7 +31772,11 @@
           <a:p>
             <a:pPr algn="ctr"/>
             <a:r>
-              <a:rPr lang="en-US" sz="1000" dirty="0"/>
+              <a:rPr lang="en-US" sz="1000" dirty="0">
+                <a:solidFill>
+                  <a:schemeClr val="tx1"/>
+                </a:solidFill>
+              </a:rPr>
               <a:t>Modified</a:t>
             </a:r>
           </a:p>

</xml_diff>